<commit_message>
Se agregó la seccion de feedback
</commit_message>
<xml_diff>
--- a/borradores/ilustrations.pptx
+++ b/borradores/ilustrations.pptx
@@ -6,6 +6,7 @@
   </p:sldMasterIdLst>
   <p:sldIdLst>
     <p:sldId id="256" r:id="rId2"/>
+    <p:sldId id="257" r:id="rId3"/>
   </p:sldIdLst>
   <p:sldSz cx="12192000" cy="6858000"/>
   <p:notesSz cx="6858000" cy="9144000"/>
@@ -104,6 +105,11 @@
       </a:defRPr>
     </a:lvl9pPr>
   </p:defaultTextStyle>
+  <p:extLst>
+    <p:ext uri="{EFAFB233-063F-42B5-8137-9DF3F51BA10A}">
+      <p15:sldGuideLst xmlns:p15="http://schemas.microsoft.com/office/powerpoint/2012/main"/>
+    </p:ext>
+  </p:extLst>
 </p:presentation>
 </file>
 
@@ -256,7 +262,7 @@
           <a:p>
             <a:fld id="{41BE0FAB-6C84-4403-B394-75F5527BB5D7}" type="datetimeFigureOut">
               <a:rPr lang="es-MX" smtClean="0"/>
-              <a:t>27/01/2022</a:t>
+              <a:t>28/01/2022</a:t>
             </a:fld>
             <a:endParaRPr lang="es-MX"/>
           </a:p>
@@ -456,7 +462,7 @@
           <a:p>
             <a:fld id="{41BE0FAB-6C84-4403-B394-75F5527BB5D7}" type="datetimeFigureOut">
               <a:rPr lang="es-MX" smtClean="0"/>
-              <a:t>27/01/2022</a:t>
+              <a:t>28/01/2022</a:t>
             </a:fld>
             <a:endParaRPr lang="es-MX"/>
           </a:p>
@@ -666,7 +672,7 @@
           <a:p>
             <a:fld id="{41BE0FAB-6C84-4403-B394-75F5527BB5D7}" type="datetimeFigureOut">
               <a:rPr lang="es-MX" smtClean="0"/>
-              <a:t>27/01/2022</a:t>
+              <a:t>28/01/2022</a:t>
             </a:fld>
             <a:endParaRPr lang="es-MX"/>
           </a:p>
@@ -866,7 +872,7 @@
           <a:p>
             <a:fld id="{41BE0FAB-6C84-4403-B394-75F5527BB5D7}" type="datetimeFigureOut">
               <a:rPr lang="es-MX" smtClean="0"/>
-              <a:t>27/01/2022</a:t>
+              <a:t>28/01/2022</a:t>
             </a:fld>
             <a:endParaRPr lang="es-MX"/>
           </a:p>
@@ -1142,7 +1148,7 @@
           <a:p>
             <a:fld id="{41BE0FAB-6C84-4403-B394-75F5527BB5D7}" type="datetimeFigureOut">
               <a:rPr lang="es-MX" smtClean="0"/>
-              <a:t>27/01/2022</a:t>
+              <a:t>28/01/2022</a:t>
             </a:fld>
             <a:endParaRPr lang="es-MX"/>
           </a:p>
@@ -1410,7 +1416,7 @@
           <a:p>
             <a:fld id="{41BE0FAB-6C84-4403-B394-75F5527BB5D7}" type="datetimeFigureOut">
               <a:rPr lang="es-MX" smtClean="0"/>
-              <a:t>27/01/2022</a:t>
+              <a:t>28/01/2022</a:t>
             </a:fld>
             <a:endParaRPr lang="es-MX"/>
           </a:p>
@@ -1825,7 +1831,7 @@
           <a:p>
             <a:fld id="{41BE0FAB-6C84-4403-B394-75F5527BB5D7}" type="datetimeFigureOut">
               <a:rPr lang="es-MX" smtClean="0"/>
-              <a:t>27/01/2022</a:t>
+              <a:t>28/01/2022</a:t>
             </a:fld>
             <a:endParaRPr lang="es-MX"/>
           </a:p>
@@ -1967,7 +1973,7 @@
           <a:p>
             <a:fld id="{41BE0FAB-6C84-4403-B394-75F5527BB5D7}" type="datetimeFigureOut">
               <a:rPr lang="es-MX" smtClean="0"/>
-              <a:t>27/01/2022</a:t>
+              <a:t>28/01/2022</a:t>
             </a:fld>
             <a:endParaRPr lang="es-MX"/>
           </a:p>
@@ -2080,7 +2086,7 @@
           <a:p>
             <a:fld id="{41BE0FAB-6C84-4403-B394-75F5527BB5D7}" type="datetimeFigureOut">
               <a:rPr lang="es-MX" smtClean="0"/>
-              <a:t>27/01/2022</a:t>
+              <a:t>28/01/2022</a:t>
             </a:fld>
             <a:endParaRPr lang="es-MX"/>
           </a:p>
@@ -2393,7 +2399,7 @@
           <a:p>
             <a:fld id="{41BE0FAB-6C84-4403-B394-75F5527BB5D7}" type="datetimeFigureOut">
               <a:rPr lang="es-MX" smtClean="0"/>
-              <a:t>27/01/2022</a:t>
+              <a:t>28/01/2022</a:t>
             </a:fld>
             <a:endParaRPr lang="es-MX"/>
           </a:p>
@@ -2682,7 +2688,7 @@
           <a:p>
             <a:fld id="{41BE0FAB-6C84-4403-B394-75F5527BB5D7}" type="datetimeFigureOut">
               <a:rPr lang="es-MX" smtClean="0"/>
-              <a:t>27/01/2022</a:t>
+              <a:t>28/01/2022</a:t>
             </a:fld>
             <a:endParaRPr lang="es-MX"/>
           </a:p>
@@ -2925,7 +2931,7 @@
           <a:p>
             <a:fld id="{41BE0FAB-6C84-4403-B394-75F5527BB5D7}" type="datetimeFigureOut">
               <a:rPr lang="es-MX" smtClean="0"/>
-              <a:t>27/01/2022</a:t>
+              <a:t>28/01/2022</a:t>
             </a:fld>
             <a:endParaRPr lang="es-MX"/>
           </a:p>
@@ -3344,10 +3350,10 @@
       </p:grpSpPr>
       <p:pic>
         <p:nvPicPr>
-          <p:cNvPr id="7" name="Gráfico 6" descr="Plato tapado con relleno sólido">
-            <a:extLst>
-              <a:ext uri="{FF2B5EF4-FFF2-40B4-BE49-F238E27FC236}">
-                <a16:creationId xmlns:a16="http://schemas.microsoft.com/office/drawing/2014/main" id="{A30C13B6-5C86-4E0F-94DD-3A8988FA1ACD}"/>
+          <p:cNvPr id="9" name="Gráfico 8" descr="Gorro de cocinero con relleno sólido">
+            <a:extLst>
+              <a:ext uri="{FF2B5EF4-FFF2-40B4-BE49-F238E27FC236}">
+                <a16:creationId xmlns:a16="http://schemas.microsoft.com/office/drawing/2014/main" id="{E3AF0BE4-F878-4C72-805E-6F7EE71C63FE}"/>
               </a:ext>
             </a:extLst>
           </p:cNvPr>
@@ -3373,7 +3379,7 @@
         </p:blipFill>
         <p:spPr>
           <a:xfrm>
-            <a:off x="5775737" y="913955"/>
+            <a:off x="7506343" y="913955"/>
             <a:ext cx="914400" cy="914400"/>
           </a:xfrm>
           <a:prstGeom prst="rect">
@@ -3381,65 +3387,29 @@
           </a:prstGeom>
         </p:spPr>
       </p:pic>
-      <p:pic>
-        <p:nvPicPr>
-          <p:cNvPr id="9" name="Gráfico 8" descr="Gorro de cocinero con relleno sólido">
-            <a:extLst>
-              <a:ext uri="{FF2B5EF4-FFF2-40B4-BE49-F238E27FC236}">
-                <a16:creationId xmlns:a16="http://schemas.microsoft.com/office/drawing/2014/main" id="{E3AF0BE4-F878-4C72-805E-6F7EE71C63FE}"/>
-              </a:ext>
-            </a:extLst>
-          </p:cNvPr>
-          <p:cNvPicPr>
-            <a:picLocks noChangeAspect="1"/>
-          </p:cNvPicPr>
+      <p:sp>
+        <p:nvSpPr>
+          <p:cNvPr id="10" name="Rectángulo 9">
+            <a:extLst>
+              <a:ext uri="{FF2B5EF4-FFF2-40B4-BE49-F238E27FC236}">
+                <a16:creationId xmlns:a16="http://schemas.microsoft.com/office/drawing/2014/main" id="{27EAAA5A-D16A-4AE4-8D11-9607812D0BE4}"/>
+              </a:ext>
+            </a:extLst>
+          </p:cNvPr>
+          <p:cNvSpPr/>
           <p:nvPr/>
-        </p:nvPicPr>
-        <p:blipFill>
-          <a:blip r:embed="rId4">
-            <a:extLst>
-              <a:ext uri="{28A0092B-C50C-407E-A947-70E740481C1C}">
-                <a14:useLocalDpi xmlns:a14="http://schemas.microsoft.com/office/drawing/2010/main" val="0"/>
-              </a:ext>
-              <a:ext uri="{96DAC541-7B7A-43D3-8B79-37D633B846F1}">
-                <asvg:svgBlip xmlns:asvg="http://schemas.microsoft.com/office/drawing/2016/SVG/main" r:embed="rId5"/>
-              </a:ext>
-            </a:extLst>
-          </a:blip>
-          <a:stretch>
-            <a:fillRect/>
-          </a:stretch>
-        </p:blipFill>
-        <p:spPr>
-          <a:xfrm>
-            <a:off x="7506343" y="913955"/>
-            <a:ext cx="914400" cy="914400"/>
+        </p:nvSpPr>
+        <p:spPr>
+          <a:xfrm>
+            <a:off x="8255348" y="3333919"/>
+            <a:ext cx="4362995" cy="3278777"/>
           </a:xfrm>
           <a:prstGeom prst="rect">
             <a:avLst/>
           </a:prstGeom>
-        </p:spPr>
-      </p:pic>
-      <p:sp>
-        <p:nvSpPr>
-          <p:cNvPr id="10" name="Rectángulo 9">
-            <a:extLst>
-              <a:ext uri="{FF2B5EF4-FFF2-40B4-BE49-F238E27FC236}">
-                <a16:creationId xmlns:a16="http://schemas.microsoft.com/office/drawing/2014/main" id="{27EAAA5A-D16A-4AE4-8D11-9607812D0BE4}"/>
-              </a:ext>
-            </a:extLst>
-          </p:cNvPr>
-          <p:cNvSpPr/>
-          <p:nvPr/>
-        </p:nvSpPr>
-        <p:spPr>
-          <a:xfrm>
-            <a:off x="888273" y="2233748"/>
-            <a:ext cx="4362995" cy="3278777"/>
-          </a:xfrm>
-          <a:prstGeom prst="rect">
-            <a:avLst/>
-          </a:prstGeom>
+          <a:solidFill>
+            <a:srgbClr val="002060"/>
+          </a:solidFill>
         </p:spPr>
         <p:style>
           <a:lnRef idx="2">
@@ -3481,13 +3451,13 @@
           <p:nvPr/>
         </p:nvPicPr>
         <p:blipFill>
-          <a:blip r:embed="rId6">
+          <a:blip r:embed="rId4">
             <a:extLst>
               <a:ext uri="{28A0092B-C50C-407E-A947-70E740481C1C}">
                 <a14:useLocalDpi xmlns:a14="http://schemas.microsoft.com/office/drawing/2010/main" val="0"/>
               </a:ext>
               <a:ext uri="{96DAC541-7B7A-43D3-8B79-37D633B846F1}">
-                <asvg:svgBlip xmlns:asvg="http://schemas.microsoft.com/office/drawing/2016/SVG/main" r:embed="rId7"/>
+                <asvg:svgBlip xmlns:asvg="http://schemas.microsoft.com/office/drawing/2016/SVG/main" r:embed="rId5"/>
               </a:ext>
             </a:extLst>
           </a:blip>
@@ -3497,7 +3467,7 @@
         </p:blipFill>
         <p:spPr>
           <a:xfrm>
-            <a:off x="2490653" y="3069326"/>
+            <a:off x="4228458" y="913955"/>
             <a:ext cx="914400" cy="914400"/>
           </a:xfrm>
           <a:prstGeom prst="rect">
@@ -3505,26 +3475,69 @@
           </a:prstGeom>
         </p:spPr>
       </p:pic>
-      <p:sp>
-        <p:nvSpPr>
-          <p:cNvPr id="11" name="Rectángulo 10">
-            <a:extLst>
-              <a:ext uri="{FF2B5EF4-FFF2-40B4-BE49-F238E27FC236}">
-                <a16:creationId xmlns:a16="http://schemas.microsoft.com/office/drawing/2014/main" id="{A134F784-E78D-4E12-8B53-A6C5A1B15B0C}"/>
-              </a:ext>
-            </a:extLst>
-          </p:cNvPr>
-          <p:cNvSpPr/>
+      <p:pic>
+        <p:nvPicPr>
+          <p:cNvPr id="3" name="Gráfico 2" descr="Cactus con relleno sólido">
+            <a:extLst>
+              <a:ext uri="{FF2B5EF4-FFF2-40B4-BE49-F238E27FC236}">
+                <a16:creationId xmlns:a16="http://schemas.microsoft.com/office/drawing/2014/main" id="{24373A24-6DFF-4F78-B4BE-3724FD9FABAB}"/>
+              </a:ext>
+            </a:extLst>
+          </p:cNvPr>
+          <p:cNvPicPr>
+            <a:picLocks noChangeAspect="1"/>
+          </p:cNvPicPr>
           <p:nvPr/>
-        </p:nvSpPr>
-        <p:spPr>
-          <a:xfrm>
-            <a:off x="2059035" y="3873136"/>
-            <a:ext cx="1777635" cy="568235"/>
+        </p:nvPicPr>
+        <p:blipFill>
+          <a:blip r:embed="rId6">
+            <a:extLst>
+              <a:ext uri="{28A0092B-C50C-407E-A947-70E740481C1C}">
+                <a14:useLocalDpi xmlns:a14="http://schemas.microsoft.com/office/drawing/2010/main" val="0"/>
+              </a:ext>
+              <a:ext uri="{96DAC541-7B7A-43D3-8B79-37D633B846F1}">
+                <asvg:svgBlip xmlns:asvg="http://schemas.microsoft.com/office/drawing/2016/SVG/main" r:embed="rId7"/>
+              </a:ext>
+            </a:extLst>
+          </a:blip>
+          <a:stretch>
+            <a:fillRect/>
+          </a:stretch>
+        </p:blipFill>
+        <p:spPr>
+          <a:xfrm>
+            <a:off x="8445019" y="3797524"/>
+            <a:ext cx="338517" cy="338517"/>
           </a:xfrm>
           <a:prstGeom prst="rect">
             <a:avLst/>
           </a:prstGeom>
+        </p:spPr>
+      </p:pic>
+      <p:sp>
+        <p:nvSpPr>
+          <p:cNvPr id="8" name="Rectángulo 7">
+            <a:extLst>
+              <a:ext uri="{FF2B5EF4-FFF2-40B4-BE49-F238E27FC236}">
+                <a16:creationId xmlns:a16="http://schemas.microsoft.com/office/drawing/2014/main" id="{E50A51C1-2B9D-4BF9-AB7B-1930FE5187DC}"/>
+              </a:ext>
+            </a:extLst>
+          </p:cNvPr>
+          <p:cNvSpPr/>
+          <p:nvPr/>
+        </p:nvSpPr>
+        <p:spPr>
+          <a:xfrm>
+            <a:off x="7800722" y="4013650"/>
+            <a:ext cx="2727016" cy="744467"/>
+          </a:xfrm>
+          <a:prstGeom prst="rect">
+            <a:avLst/>
+          </a:prstGeom>
+          <a:noFill/>
+          <a:ln>
+            <a:noFill/>
+          </a:ln>
         </p:spPr>
         <p:style>
           <a:lnRef idx="2">
@@ -3548,16 +3561,2640 @@
           <a:p>
             <a:pPr algn="ctr"/>
             <a:r>
-              <a:rPr lang="es-MX" dirty="0"/>
-              <a:t>MEXICAN TACO</a:t>
-            </a:r>
-          </a:p>
-        </p:txBody>
-      </p:sp>
+              <a:rPr lang="es-MX" sz="4000" b="1" spc="30" dirty="0">
+                <a:latin typeface="Bahnschrift Condensed" panose="020B0502040204020203" pitchFamily="34" charset="0"/>
+              </a:rPr>
+              <a:t>El Arriero</a:t>
+            </a:r>
+          </a:p>
+        </p:txBody>
+      </p:sp>
+      <p:cxnSp>
+        <p:nvCxnSpPr>
+          <p:cNvPr id="14" name="Conector recto 13">
+            <a:extLst>
+              <a:ext uri="{FF2B5EF4-FFF2-40B4-BE49-F238E27FC236}">
+                <a16:creationId xmlns:a16="http://schemas.microsoft.com/office/drawing/2014/main" id="{2FECDDC4-1886-4A2E-9995-F72AEB23A287}"/>
+              </a:ext>
+            </a:extLst>
+          </p:cNvPr>
+          <p:cNvCxnSpPr>
+            <a:cxnSpLocks/>
+          </p:cNvCxnSpPr>
+          <p:nvPr/>
+        </p:nvCxnSpPr>
+        <p:spPr>
+          <a:xfrm>
+            <a:off x="8342888" y="4126938"/>
+            <a:ext cx="1610316" cy="9103"/>
+          </a:xfrm>
+          <a:prstGeom prst="line">
+            <a:avLst/>
+          </a:prstGeom>
+          <a:ln w="19050">
+            <a:solidFill>
+              <a:schemeClr val="bg1"/>
+            </a:solidFill>
+          </a:ln>
+        </p:spPr>
+        <p:style>
+          <a:lnRef idx="1">
+            <a:schemeClr val="accent1"/>
+          </a:lnRef>
+          <a:fillRef idx="0">
+            <a:schemeClr val="accent1"/>
+          </a:fillRef>
+          <a:effectRef idx="0">
+            <a:schemeClr val="accent1"/>
+          </a:effectRef>
+          <a:fontRef idx="minor">
+            <a:schemeClr val="tx1"/>
+          </a:fontRef>
+        </p:style>
+      </p:cxnSp>
+      <p:sp>
+        <p:nvSpPr>
+          <p:cNvPr id="21" name="Rectángulo 20">
+            <a:extLst>
+              <a:ext uri="{FF2B5EF4-FFF2-40B4-BE49-F238E27FC236}">
+                <a16:creationId xmlns:a16="http://schemas.microsoft.com/office/drawing/2014/main" id="{B0E5A1BB-745A-4C3F-A56B-528AFC52B0DA}"/>
+              </a:ext>
+            </a:extLst>
+          </p:cNvPr>
+          <p:cNvSpPr/>
+          <p:nvPr/>
+        </p:nvSpPr>
+        <p:spPr>
+          <a:xfrm>
+            <a:off x="8544249" y="3793416"/>
+            <a:ext cx="1690255" cy="342625"/>
+          </a:xfrm>
+          <a:prstGeom prst="rect">
+            <a:avLst/>
+          </a:prstGeom>
+          <a:noFill/>
+          <a:ln>
+            <a:noFill/>
+          </a:ln>
+        </p:spPr>
+        <p:style>
+          <a:lnRef idx="2">
+            <a:schemeClr val="accent1">
+              <a:shade val="50000"/>
+            </a:schemeClr>
+          </a:lnRef>
+          <a:fillRef idx="1">
+            <a:schemeClr val="accent1"/>
+          </a:fillRef>
+          <a:effectRef idx="0">
+            <a:schemeClr val="accent1"/>
+          </a:effectRef>
+          <a:fontRef idx="minor">
+            <a:schemeClr val="lt1"/>
+          </a:fontRef>
+        </p:style>
+        <p:txBody>
+          <a:bodyPr rtlCol="0" anchor="ctr"/>
+          <a:lstStyle/>
+          <a:p>
+            <a:pPr algn="ctr"/>
+            <a:r>
+              <a:rPr lang="es-MX" spc="30" dirty="0">
+                <a:latin typeface="Bahnschrift Light SemiCondensed" panose="020B0502040204020203" pitchFamily="34" charset="0"/>
+              </a:rPr>
+              <a:t>Restaurante</a:t>
+            </a:r>
+          </a:p>
+        </p:txBody>
+      </p:sp>
+      <p:cxnSp>
+        <p:nvCxnSpPr>
+          <p:cNvPr id="24" name="Conector recto 23">
+            <a:extLst>
+              <a:ext uri="{FF2B5EF4-FFF2-40B4-BE49-F238E27FC236}">
+                <a16:creationId xmlns:a16="http://schemas.microsoft.com/office/drawing/2014/main" id="{58825FC6-FE4B-45FC-83BC-A75EA4FC083A}"/>
+              </a:ext>
+            </a:extLst>
+          </p:cNvPr>
+          <p:cNvCxnSpPr>
+            <a:cxnSpLocks/>
+          </p:cNvCxnSpPr>
+          <p:nvPr/>
+        </p:nvCxnSpPr>
+        <p:spPr>
+          <a:xfrm>
+            <a:off x="8342888" y="4687372"/>
+            <a:ext cx="1610316" cy="0"/>
+          </a:xfrm>
+          <a:prstGeom prst="line">
+            <a:avLst/>
+          </a:prstGeom>
+          <a:ln w="19050">
+            <a:solidFill>
+              <a:schemeClr val="bg1"/>
+            </a:solidFill>
+          </a:ln>
+        </p:spPr>
+        <p:style>
+          <a:lnRef idx="1">
+            <a:schemeClr val="accent1"/>
+          </a:lnRef>
+          <a:fillRef idx="0">
+            <a:schemeClr val="accent1"/>
+          </a:fillRef>
+          <a:effectRef idx="0">
+            <a:schemeClr val="accent1"/>
+          </a:effectRef>
+          <a:fontRef idx="minor">
+            <a:schemeClr val="tx1"/>
+          </a:fontRef>
+        </p:style>
+      </p:cxnSp>
+      <p:cxnSp>
+        <p:nvCxnSpPr>
+          <p:cNvPr id="27" name="Conector recto 26">
+            <a:extLst>
+              <a:ext uri="{FF2B5EF4-FFF2-40B4-BE49-F238E27FC236}">
+                <a16:creationId xmlns:a16="http://schemas.microsoft.com/office/drawing/2014/main" id="{5CB355D5-DB8F-4460-BFB1-AA5B7B74322C}"/>
+              </a:ext>
+            </a:extLst>
+          </p:cNvPr>
+          <p:cNvCxnSpPr>
+            <a:cxnSpLocks/>
+          </p:cNvCxnSpPr>
+          <p:nvPr/>
+        </p:nvCxnSpPr>
+        <p:spPr>
+          <a:xfrm>
+            <a:off x="3947074" y="4746424"/>
+            <a:ext cx="2160574" cy="0"/>
+          </a:xfrm>
+          <a:prstGeom prst="line">
+            <a:avLst/>
+          </a:prstGeom>
+          <a:ln w="28575">
+            <a:solidFill>
+              <a:srgbClr val="FF0000"/>
+            </a:solidFill>
+          </a:ln>
+        </p:spPr>
+        <p:style>
+          <a:lnRef idx="1">
+            <a:schemeClr val="accent1"/>
+          </a:lnRef>
+          <a:fillRef idx="0">
+            <a:schemeClr val="accent1"/>
+          </a:fillRef>
+          <a:effectRef idx="0">
+            <a:schemeClr val="accent1"/>
+          </a:effectRef>
+          <a:fontRef idx="minor">
+            <a:schemeClr val="tx1"/>
+          </a:fontRef>
+        </p:style>
+      </p:cxnSp>
+      <p:grpSp>
+        <p:nvGrpSpPr>
+          <p:cNvPr id="31" name="Grupo 30">
+            <a:extLst>
+              <a:ext uri="{FF2B5EF4-FFF2-40B4-BE49-F238E27FC236}">
+                <a16:creationId xmlns:a16="http://schemas.microsoft.com/office/drawing/2014/main" id="{5D629FB4-8DAD-472F-A3D5-096772FB87C4}"/>
+              </a:ext>
+            </a:extLst>
+          </p:cNvPr>
+          <p:cNvGrpSpPr/>
+          <p:nvPr/>
+        </p:nvGrpSpPr>
+        <p:grpSpPr>
+          <a:xfrm>
+            <a:off x="4126623" y="5232312"/>
+            <a:ext cx="2564331" cy="927270"/>
+            <a:chOff x="3423774" y="3333919"/>
+            <a:chExt cx="2564331" cy="927270"/>
+          </a:xfrm>
+        </p:grpSpPr>
+        <p:pic>
+          <p:nvPicPr>
+            <p:cNvPr id="25" name="Gráfico 24" descr="Cactus con relleno sólido">
+              <a:extLst>
+                <a:ext uri="{FF2B5EF4-FFF2-40B4-BE49-F238E27FC236}">
+                  <a16:creationId xmlns:a16="http://schemas.microsoft.com/office/drawing/2014/main" id="{2872B63A-D0AA-45AF-8560-D2A375235633}"/>
+                </a:ext>
+              </a:extLst>
+            </p:cNvPr>
+            <p:cNvPicPr>
+              <a:picLocks noChangeAspect="1"/>
+            </p:cNvPicPr>
+            <p:nvPr/>
+          </p:nvPicPr>
+          <p:blipFill>
+            <a:blip r:embed="rId8">
+              <a:extLst>
+                <a:ext uri="{28A0092B-C50C-407E-A947-70E740481C1C}">
+                  <a14:useLocalDpi xmlns:a14="http://schemas.microsoft.com/office/drawing/2010/main" val="0"/>
+                </a:ext>
+                <a:ext uri="{96DAC541-7B7A-43D3-8B79-37D633B846F1}">
+                  <asvg:svgBlip xmlns:asvg="http://schemas.microsoft.com/office/drawing/2016/SVG/main" r:embed="rId9"/>
+                </a:ext>
+              </a:extLst>
+            </a:blip>
+            <a:stretch>
+              <a:fillRect/>
+            </a:stretch>
+          </p:blipFill>
+          <p:spPr>
+            <a:xfrm>
+              <a:off x="3423774" y="3544315"/>
+              <a:ext cx="795375" cy="716874"/>
+            </a:xfrm>
+            <a:prstGeom prst="rect">
+              <a:avLst/>
+            </a:prstGeom>
+          </p:spPr>
+        </p:pic>
+        <p:sp>
+          <p:nvSpPr>
+            <p:cNvPr id="26" name="Rectángulo 25">
+              <a:extLst>
+                <a:ext uri="{FF2B5EF4-FFF2-40B4-BE49-F238E27FC236}">
+                  <a16:creationId xmlns:a16="http://schemas.microsoft.com/office/drawing/2014/main" id="{2F807005-4452-4233-B8CC-14FCAD416674}"/>
+                </a:ext>
+              </a:extLst>
+            </p:cNvPr>
+            <p:cNvSpPr/>
+            <p:nvPr/>
+          </p:nvSpPr>
+          <p:spPr>
+            <a:xfrm>
+              <a:off x="3832048" y="3333919"/>
+              <a:ext cx="2156057" cy="744467"/>
+            </a:xfrm>
+            <a:prstGeom prst="rect">
+              <a:avLst/>
+            </a:prstGeom>
+            <a:noFill/>
+            <a:ln>
+              <a:noFill/>
+            </a:ln>
+          </p:spPr>
+          <p:style>
+            <a:lnRef idx="2">
+              <a:schemeClr val="accent1">
+                <a:shade val="50000"/>
+              </a:schemeClr>
+            </a:lnRef>
+            <a:fillRef idx="1">
+              <a:schemeClr val="accent1"/>
+            </a:fillRef>
+            <a:effectRef idx="0">
+              <a:schemeClr val="accent1"/>
+            </a:effectRef>
+            <a:fontRef idx="minor">
+              <a:schemeClr val="lt1"/>
+            </a:fontRef>
+          </p:style>
+          <p:txBody>
+            <a:bodyPr rtlCol="0" anchor="ctr"/>
+            <a:lstStyle/>
+            <a:p>
+              <a:pPr algn="ctr"/>
+              <a:r>
+                <a:rPr lang="es-MX" sz="4000" b="1" spc="30" dirty="0">
+                  <a:solidFill>
+                    <a:srgbClr val="002060"/>
+                  </a:solidFill>
+                  <a:latin typeface="Bahnschrift Condensed" panose="020B0502040204020203" pitchFamily="34" charset="0"/>
+                </a:rPr>
+                <a:t>El Arriero</a:t>
+              </a:r>
+            </a:p>
+          </p:txBody>
+        </p:sp>
+        <p:sp>
+          <p:nvSpPr>
+            <p:cNvPr id="28" name="Rectángulo 27">
+              <a:extLst>
+                <a:ext uri="{FF2B5EF4-FFF2-40B4-BE49-F238E27FC236}">
+                  <a16:creationId xmlns:a16="http://schemas.microsoft.com/office/drawing/2014/main" id="{02508345-E1FE-49A3-8CD5-5C398E9160FC}"/>
+                </a:ext>
+              </a:extLst>
+            </p:cNvPr>
+            <p:cNvSpPr/>
+            <p:nvPr/>
+          </p:nvSpPr>
+          <p:spPr>
+            <a:xfrm>
+              <a:off x="4106841" y="3973189"/>
+              <a:ext cx="1589952" cy="288000"/>
+            </a:xfrm>
+            <a:prstGeom prst="rect">
+              <a:avLst/>
+            </a:prstGeom>
+            <a:solidFill>
+              <a:srgbClr val="002060"/>
+            </a:solidFill>
+            <a:ln>
+              <a:noFill/>
+            </a:ln>
+          </p:spPr>
+          <p:style>
+            <a:lnRef idx="2">
+              <a:schemeClr val="accent1">
+                <a:shade val="50000"/>
+              </a:schemeClr>
+            </a:lnRef>
+            <a:fillRef idx="1">
+              <a:schemeClr val="accent1"/>
+            </a:fillRef>
+            <a:effectRef idx="0">
+              <a:schemeClr val="accent1"/>
+            </a:effectRef>
+            <a:fontRef idx="minor">
+              <a:schemeClr val="lt1"/>
+            </a:fontRef>
+          </p:style>
+          <p:txBody>
+            <a:bodyPr rtlCol="0" anchor="ctr"/>
+            <a:lstStyle/>
+            <a:p>
+              <a:pPr algn="ctr"/>
+              <a:r>
+                <a:rPr lang="es-MX" spc="30" dirty="0">
+                  <a:solidFill>
+                    <a:schemeClr val="bg1"/>
+                  </a:solidFill>
+                  <a:latin typeface="Bahnschrift Light SemiCondensed" panose="020B0502040204020203" pitchFamily="34" charset="0"/>
+                </a:rPr>
+                <a:t>Restaurante</a:t>
+              </a:r>
+            </a:p>
+          </p:txBody>
+        </p:sp>
+      </p:grpSp>
+      <p:cxnSp>
+        <p:nvCxnSpPr>
+          <p:cNvPr id="29" name="Conector recto 28">
+            <a:extLst>
+              <a:ext uri="{FF2B5EF4-FFF2-40B4-BE49-F238E27FC236}">
+                <a16:creationId xmlns:a16="http://schemas.microsoft.com/office/drawing/2014/main" id="{8963C1C0-2736-48A9-ADC1-7FDD21858BBC}"/>
+              </a:ext>
+            </a:extLst>
+          </p:cNvPr>
+          <p:cNvCxnSpPr>
+            <a:cxnSpLocks/>
+          </p:cNvCxnSpPr>
+          <p:nvPr/>
+        </p:nvCxnSpPr>
+        <p:spPr>
+          <a:xfrm>
+            <a:off x="3947074" y="5371594"/>
+            <a:ext cx="2160574" cy="0"/>
+          </a:xfrm>
+          <a:prstGeom prst="line">
+            <a:avLst/>
+          </a:prstGeom>
+          <a:ln w="28575">
+            <a:solidFill>
+              <a:srgbClr val="FF0000"/>
+            </a:solidFill>
+          </a:ln>
+        </p:spPr>
+        <p:style>
+          <a:lnRef idx="1">
+            <a:schemeClr val="accent1"/>
+          </a:lnRef>
+          <a:fillRef idx="0">
+            <a:schemeClr val="accent1"/>
+          </a:fillRef>
+          <a:effectRef idx="0">
+            <a:schemeClr val="accent1"/>
+          </a:effectRef>
+          <a:fontRef idx="minor">
+            <a:schemeClr val="tx1"/>
+          </a:fontRef>
+        </p:style>
+      </p:cxnSp>
+      <p:grpSp>
+        <p:nvGrpSpPr>
+          <p:cNvPr id="41" name="Grupo 40">
+            <a:extLst>
+              <a:ext uri="{FF2B5EF4-FFF2-40B4-BE49-F238E27FC236}">
+                <a16:creationId xmlns:a16="http://schemas.microsoft.com/office/drawing/2014/main" id="{0CAE1F59-E3C8-45A6-9F28-4968856D0FD9}"/>
+              </a:ext>
+            </a:extLst>
+          </p:cNvPr>
+          <p:cNvGrpSpPr/>
+          <p:nvPr/>
+        </p:nvGrpSpPr>
+        <p:grpSpPr>
+          <a:xfrm>
+            <a:off x="3694015" y="3057809"/>
+            <a:ext cx="1891616" cy="920607"/>
+            <a:chOff x="3694015" y="3057809"/>
+            <a:chExt cx="1891616" cy="920607"/>
+          </a:xfrm>
+        </p:grpSpPr>
+        <p:pic>
+          <p:nvPicPr>
+            <p:cNvPr id="36" name="Gráfico 35" descr="Cactus con relleno sólido">
+              <a:extLst>
+                <a:ext uri="{FF2B5EF4-FFF2-40B4-BE49-F238E27FC236}">
+                  <a16:creationId xmlns:a16="http://schemas.microsoft.com/office/drawing/2014/main" id="{0016FB26-55FF-4BEE-89BD-3D22C66CEA07}"/>
+                </a:ext>
+              </a:extLst>
+            </p:cNvPr>
+            <p:cNvPicPr>
+              <a:picLocks noChangeAspect="1"/>
+            </p:cNvPicPr>
+            <p:nvPr/>
+          </p:nvPicPr>
+          <p:blipFill rotWithShape="1">
+            <a:blip r:embed="rId10">
+              <a:extLst>
+                <a:ext uri="{28A0092B-C50C-407E-A947-70E740481C1C}">
+                  <a14:useLocalDpi xmlns:a14="http://schemas.microsoft.com/office/drawing/2010/main" val="0"/>
+                </a:ext>
+                <a:ext uri="{96DAC541-7B7A-43D3-8B79-37D633B846F1}">
+                  <asvg:svgBlip xmlns:asvg="http://schemas.microsoft.com/office/drawing/2016/SVG/main" r:embed="rId11"/>
+                </a:ext>
+              </a:extLst>
+            </a:blip>
+            <a:srcRect l="19505" r="20468"/>
+            <a:stretch/>
+          </p:blipFill>
+          <p:spPr>
+            <a:xfrm>
+              <a:off x="3962706" y="3057809"/>
+              <a:ext cx="245881" cy="338517"/>
+            </a:xfrm>
+            <a:prstGeom prst="rect">
+              <a:avLst/>
+            </a:prstGeom>
+          </p:spPr>
+        </p:pic>
+        <p:sp>
+          <p:nvSpPr>
+            <p:cNvPr id="37" name="Rectángulo 36">
+              <a:extLst>
+                <a:ext uri="{FF2B5EF4-FFF2-40B4-BE49-F238E27FC236}">
+                  <a16:creationId xmlns:a16="http://schemas.microsoft.com/office/drawing/2014/main" id="{6E39B168-E63F-4E98-8858-9F8715FFF9E7}"/>
+                </a:ext>
+              </a:extLst>
+            </p:cNvPr>
+            <p:cNvSpPr/>
+            <p:nvPr/>
+          </p:nvSpPr>
+          <p:spPr>
+            <a:xfrm>
+              <a:off x="3694015" y="3233949"/>
+              <a:ext cx="1891616" cy="744467"/>
+            </a:xfrm>
+            <a:prstGeom prst="rect">
+              <a:avLst/>
+            </a:prstGeom>
+            <a:noFill/>
+            <a:ln>
+              <a:noFill/>
+            </a:ln>
+          </p:spPr>
+          <p:style>
+            <a:lnRef idx="2">
+              <a:schemeClr val="accent1">
+                <a:shade val="50000"/>
+              </a:schemeClr>
+            </a:lnRef>
+            <a:fillRef idx="1">
+              <a:schemeClr val="accent1"/>
+            </a:fillRef>
+            <a:effectRef idx="0">
+              <a:schemeClr val="accent1"/>
+            </a:effectRef>
+            <a:fontRef idx="minor">
+              <a:schemeClr val="lt1"/>
+            </a:fontRef>
+          </p:style>
+          <p:txBody>
+            <a:bodyPr rtlCol="0" anchor="ctr"/>
+            <a:lstStyle/>
+            <a:p>
+              <a:pPr algn="ctr"/>
+              <a:r>
+                <a:rPr lang="es-MX" sz="4000" b="1" dirty="0">
+                  <a:solidFill>
+                    <a:srgbClr val="FF3300"/>
+                  </a:solidFill>
+                  <a:latin typeface="Bahnschrift Condensed" panose="020B0502040204020203" pitchFamily="34" charset="0"/>
+                </a:rPr>
+                <a:t>El Arriero</a:t>
+              </a:r>
+            </a:p>
+          </p:txBody>
+        </p:sp>
+        <p:cxnSp>
+          <p:nvCxnSpPr>
+            <p:cNvPr id="38" name="Conector recto 37">
+              <a:extLst>
+                <a:ext uri="{FF2B5EF4-FFF2-40B4-BE49-F238E27FC236}">
+                  <a16:creationId xmlns:a16="http://schemas.microsoft.com/office/drawing/2014/main" id="{EFD93FD3-697F-4791-9B01-7C82D71B1251}"/>
+                </a:ext>
+              </a:extLst>
+            </p:cNvPr>
+            <p:cNvCxnSpPr>
+              <a:cxnSpLocks/>
+            </p:cNvCxnSpPr>
+            <p:nvPr/>
+          </p:nvCxnSpPr>
+          <p:spPr>
+            <a:xfrm>
+              <a:off x="3859211" y="3382471"/>
+              <a:ext cx="1566229" cy="0"/>
+            </a:xfrm>
+            <a:prstGeom prst="line">
+              <a:avLst/>
+            </a:prstGeom>
+            <a:ln w="19050">
+              <a:solidFill>
+                <a:srgbClr val="56423C"/>
+              </a:solidFill>
+            </a:ln>
+          </p:spPr>
+          <p:style>
+            <a:lnRef idx="1">
+              <a:schemeClr val="accent1"/>
+            </a:lnRef>
+            <a:fillRef idx="0">
+              <a:schemeClr val="accent1"/>
+            </a:fillRef>
+            <a:effectRef idx="0">
+              <a:schemeClr val="accent1"/>
+            </a:effectRef>
+            <a:fontRef idx="minor">
+              <a:schemeClr val="tx1"/>
+            </a:fontRef>
+          </p:style>
+        </p:cxnSp>
+        <p:sp>
+          <p:nvSpPr>
+            <p:cNvPr id="39" name="Rectángulo 38">
+              <a:extLst>
+                <a:ext uri="{FF2B5EF4-FFF2-40B4-BE49-F238E27FC236}">
+                  <a16:creationId xmlns:a16="http://schemas.microsoft.com/office/drawing/2014/main" id="{ABB4E3ED-805A-4560-8B72-CD295B18060F}"/>
+                </a:ext>
+              </a:extLst>
+            </p:cNvPr>
+            <p:cNvSpPr/>
+            <p:nvPr/>
+          </p:nvSpPr>
+          <p:spPr>
+            <a:xfrm>
+              <a:off x="4205699" y="3112756"/>
+              <a:ext cx="1321341" cy="262363"/>
+            </a:xfrm>
+            <a:prstGeom prst="rect">
+              <a:avLst/>
+            </a:prstGeom>
+            <a:noFill/>
+            <a:ln>
+              <a:noFill/>
+            </a:ln>
+          </p:spPr>
+          <p:style>
+            <a:lnRef idx="2">
+              <a:schemeClr val="accent1">
+                <a:shade val="50000"/>
+              </a:schemeClr>
+            </a:lnRef>
+            <a:fillRef idx="1">
+              <a:schemeClr val="accent1"/>
+            </a:fillRef>
+            <a:effectRef idx="0">
+              <a:schemeClr val="accent1"/>
+            </a:effectRef>
+            <a:fontRef idx="minor">
+              <a:schemeClr val="lt1"/>
+            </a:fontRef>
+          </p:style>
+          <p:txBody>
+            <a:bodyPr rtlCol="0" anchor="ctr"/>
+            <a:lstStyle/>
+            <a:p>
+              <a:pPr algn="r"/>
+              <a:r>
+                <a:rPr lang="es-MX" b="1" spc="30" dirty="0">
+                  <a:solidFill>
+                    <a:srgbClr val="56423C"/>
+                  </a:solidFill>
+                  <a:latin typeface="Bahnschrift Light SemiCondensed" panose="020B0502040204020203" pitchFamily="34" charset="0"/>
+                </a:rPr>
+                <a:t>Restaurante</a:t>
+              </a:r>
+            </a:p>
+          </p:txBody>
+        </p:sp>
+        <p:cxnSp>
+          <p:nvCxnSpPr>
+            <p:cNvPr id="40" name="Conector recto 39">
+              <a:extLst>
+                <a:ext uri="{FF2B5EF4-FFF2-40B4-BE49-F238E27FC236}">
+                  <a16:creationId xmlns:a16="http://schemas.microsoft.com/office/drawing/2014/main" id="{E48AEF4F-3D15-46BD-AED3-600C7A8F2F77}"/>
+                </a:ext>
+              </a:extLst>
+            </p:cNvPr>
+            <p:cNvCxnSpPr>
+              <a:cxnSpLocks/>
+            </p:cNvCxnSpPr>
+            <p:nvPr/>
+          </p:nvCxnSpPr>
+          <p:spPr>
+            <a:xfrm>
+              <a:off x="3855303" y="3878169"/>
+              <a:ext cx="1566000" cy="0"/>
+            </a:xfrm>
+            <a:prstGeom prst="line">
+              <a:avLst/>
+            </a:prstGeom>
+            <a:ln w="19050">
+              <a:solidFill>
+                <a:srgbClr val="56423C"/>
+              </a:solidFill>
+            </a:ln>
+          </p:spPr>
+          <p:style>
+            <a:lnRef idx="1">
+              <a:schemeClr val="accent1"/>
+            </a:lnRef>
+            <a:fillRef idx="0">
+              <a:schemeClr val="accent1"/>
+            </a:fillRef>
+            <a:effectRef idx="0">
+              <a:schemeClr val="accent1"/>
+            </a:effectRef>
+            <a:fontRef idx="minor">
+              <a:schemeClr val="tx1"/>
+            </a:fontRef>
+          </p:style>
+        </p:cxnSp>
+      </p:grpSp>
+      <p:pic>
+        <p:nvPicPr>
+          <p:cNvPr id="43" name="Imagen 42">
+            <a:extLst>
+              <a:ext uri="{FF2B5EF4-FFF2-40B4-BE49-F238E27FC236}">
+                <a16:creationId xmlns:a16="http://schemas.microsoft.com/office/drawing/2014/main" id="{7B0E9664-B146-4A24-9365-EE9694CDDF48}"/>
+              </a:ext>
+            </a:extLst>
+          </p:cNvPr>
+          <p:cNvPicPr>
+            <a:picLocks noChangeAspect="1"/>
+          </p:cNvPicPr>
+          <p:nvPr/>
+        </p:nvPicPr>
+        <p:blipFill>
+          <a:blip r:embed="rId12"/>
+          <a:stretch>
+            <a:fillRect/>
+          </a:stretch>
+        </p:blipFill>
+        <p:spPr>
+          <a:xfrm>
+            <a:off x="-147638" y="189704"/>
+            <a:ext cx="7019925" cy="2686050"/>
+          </a:xfrm>
+          <a:prstGeom prst="rect">
+            <a:avLst/>
+          </a:prstGeom>
+        </p:spPr>
+      </p:pic>
+      <p:sp>
+        <p:nvSpPr>
+          <p:cNvPr id="44" name="Rectángulo 43">
+            <a:extLst>
+              <a:ext uri="{FF2B5EF4-FFF2-40B4-BE49-F238E27FC236}">
+                <a16:creationId xmlns:a16="http://schemas.microsoft.com/office/drawing/2014/main" id="{524D449A-B9B3-456E-8AAA-AB077A3DE161}"/>
+              </a:ext>
+            </a:extLst>
+          </p:cNvPr>
+          <p:cNvSpPr/>
+          <p:nvPr/>
+        </p:nvSpPr>
+        <p:spPr>
+          <a:xfrm>
+            <a:off x="542925" y="3107842"/>
+            <a:ext cx="1333500" cy="321158"/>
+          </a:xfrm>
+          <a:prstGeom prst="rect">
+            <a:avLst/>
+          </a:prstGeom>
+          <a:solidFill>
+            <a:srgbClr val="FF3300"/>
+          </a:solidFill>
+          <a:ln>
+            <a:noFill/>
+          </a:ln>
+        </p:spPr>
+        <p:style>
+          <a:lnRef idx="2">
+            <a:schemeClr val="accent1">
+              <a:shade val="50000"/>
+            </a:schemeClr>
+          </a:lnRef>
+          <a:fillRef idx="1">
+            <a:schemeClr val="accent1"/>
+          </a:fillRef>
+          <a:effectRef idx="0">
+            <a:schemeClr val="accent1"/>
+          </a:effectRef>
+          <a:fontRef idx="minor">
+            <a:schemeClr val="lt1"/>
+          </a:fontRef>
+        </p:style>
+        <p:txBody>
+          <a:bodyPr rtlCol="0" anchor="ctr"/>
+          <a:lstStyle/>
+          <a:p>
+            <a:pPr algn="ctr"/>
+            <a:endParaRPr lang="es-MX"/>
+          </a:p>
+        </p:txBody>
+      </p:sp>
+      <p:sp>
+        <p:nvSpPr>
+          <p:cNvPr id="45" name="Rectángulo 44">
+            <a:extLst>
+              <a:ext uri="{FF2B5EF4-FFF2-40B4-BE49-F238E27FC236}">
+                <a16:creationId xmlns:a16="http://schemas.microsoft.com/office/drawing/2014/main" id="{5FF31A78-E4FB-4545-9637-6273B54F49C6}"/>
+              </a:ext>
+            </a:extLst>
+          </p:cNvPr>
+          <p:cNvSpPr/>
+          <p:nvPr/>
+        </p:nvSpPr>
+        <p:spPr>
+          <a:xfrm>
+            <a:off x="1876425" y="3107842"/>
+            <a:ext cx="689697" cy="321158"/>
+          </a:xfrm>
+          <a:prstGeom prst="rect">
+            <a:avLst/>
+          </a:prstGeom>
+          <a:solidFill>
+            <a:srgbClr val="56423C"/>
+          </a:solidFill>
+          <a:ln>
+            <a:noFill/>
+          </a:ln>
+        </p:spPr>
+        <p:style>
+          <a:lnRef idx="2">
+            <a:schemeClr val="accent1">
+              <a:shade val="50000"/>
+            </a:schemeClr>
+          </a:lnRef>
+          <a:fillRef idx="1">
+            <a:schemeClr val="accent1"/>
+          </a:fillRef>
+          <a:effectRef idx="0">
+            <a:schemeClr val="accent1"/>
+          </a:effectRef>
+          <a:fontRef idx="minor">
+            <a:schemeClr val="lt1"/>
+          </a:fontRef>
+        </p:style>
+        <p:txBody>
+          <a:bodyPr rtlCol="0" anchor="ctr"/>
+          <a:lstStyle/>
+          <a:p>
+            <a:pPr algn="ctr"/>
+            <a:endParaRPr lang="es-MX"/>
+          </a:p>
+        </p:txBody>
+      </p:sp>
+      <p:sp>
+        <p:nvSpPr>
+          <p:cNvPr id="46" name="Rectángulo 45">
+            <a:extLst>
+              <a:ext uri="{FF2B5EF4-FFF2-40B4-BE49-F238E27FC236}">
+                <a16:creationId xmlns:a16="http://schemas.microsoft.com/office/drawing/2014/main" id="{E55914D1-FDA8-4BDA-BD5D-44926EE9C75E}"/>
+              </a:ext>
+            </a:extLst>
+          </p:cNvPr>
+          <p:cNvSpPr/>
+          <p:nvPr/>
+        </p:nvSpPr>
+        <p:spPr>
+          <a:xfrm>
+            <a:off x="2554434" y="3107842"/>
+            <a:ext cx="260839" cy="321158"/>
+          </a:xfrm>
+          <a:prstGeom prst="rect">
+            <a:avLst/>
+          </a:prstGeom>
+          <a:solidFill>
+            <a:srgbClr val="009900"/>
+          </a:solidFill>
+          <a:ln>
+            <a:noFill/>
+          </a:ln>
+        </p:spPr>
+        <p:style>
+          <a:lnRef idx="2">
+            <a:schemeClr val="accent1">
+              <a:shade val="50000"/>
+            </a:schemeClr>
+          </a:lnRef>
+          <a:fillRef idx="1">
+            <a:schemeClr val="accent1"/>
+          </a:fillRef>
+          <a:effectRef idx="0">
+            <a:schemeClr val="accent1"/>
+          </a:effectRef>
+          <a:fontRef idx="minor">
+            <a:schemeClr val="lt1"/>
+          </a:fontRef>
+        </p:style>
+        <p:txBody>
+          <a:bodyPr rtlCol="0" anchor="ctr"/>
+          <a:lstStyle/>
+          <a:p>
+            <a:pPr algn="ctr"/>
+            <a:endParaRPr lang="es-MX"/>
+          </a:p>
+        </p:txBody>
+      </p:sp>
+      <p:sp>
+        <p:nvSpPr>
+          <p:cNvPr id="52" name="Elipse 51">
+            <a:extLst>
+              <a:ext uri="{FF2B5EF4-FFF2-40B4-BE49-F238E27FC236}">
+                <a16:creationId xmlns:a16="http://schemas.microsoft.com/office/drawing/2014/main" id="{3128DEE9-E642-4231-8C64-AB261124404C}"/>
+              </a:ext>
+            </a:extLst>
+          </p:cNvPr>
+          <p:cNvSpPr/>
+          <p:nvPr/>
+        </p:nvSpPr>
+        <p:spPr>
+          <a:xfrm>
+            <a:off x="3301210" y="3227067"/>
+            <a:ext cx="360000" cy="360000"/>
+          </a:xfrm>
+          <a:prstGeom prst="ellipse">
+            <a:avLst/>
+          </a:prstGeom>
+          <a:solidFill>
+            <a:srgbClr val="FF3300"/>
+          </a:solidFill>
+          <a:ln>
+            <a:noFill/>
+          </a:ln>
+        </p:spPr>
+        <p:style>
+          <a:lnRef idx="2">
+            <a:schemeClr val="accent1">
+              <a:shade val="50000"/>
+            </a:schemeClr>
+          </a:lnRef>
+          <a:fillRef idx="1">
+            <a:schemeClr val="accent1"/>
+          </a:fillRef>
+          <a:effectRef idx="0">
+            <a:schemeClr val="accent1"/>
+          </a:effectRef>
+          <a:fontRef idx="minor">
+            <a:schemeClr val="lt1"/>
+          </a:fontRef>
+        </p:style>
+        <p:txBody>
+          <a:bodyPr rtlCol="0" anchor="ctr"/>
+          <a:lstStyle/>
+          <a:p>
+            <a:pPr algn="ctr"/>
+            <a:endParaRPr lang="es-MX"/>
+          </a:p>
+        </p:txBody>
+      </p:sp>
+      <p:pic>
+        <p:nvPicPr>
+          <p:cNvPr id="53" name="Gráfico 52" descr="Cactus con relleno sólido">
+            <a:extLst>
+              <a:ext uri="{FF2B5EF4-FFF2-40B4-BE49-F238E27FC236}">
+                <a16:creationId xmlns:a16="http://schemas.microsoft.com/office/drawing/2014/main" id="{A4B11DF9-D457-43D7-AF3B-CD551920BA91}"/>
+              </a:ext>
+            </a:extLst>
+          </p:cNvPr>
+          <p:cNvPicPr>
+            <a:picLocks noChangeAspect="1"/>
+          </p:cNvPicPr>
+          <p:nvPr/>
+        </p:nvPicPr>
+        <p:blipFill rotWithShape="1">
+          <a:blip r:embed="rId6">
+            <a:extLst>
+              <a:ext uri="{28A0092B-C50C-407E-A947-70E740481C1C}">
+                <a14:useLocalDpi xmlns:a14="http://schemas.microsoft.com/office/drawing/2010/main" val="0"/>
+              </a:ext>
+              <a:ext uri="{96DAC541-7B7A-43D3-8B79-37D633B846F1}">
+                <asvg:svgBlip xmlns:asvg="http://schemas.microsoft.com/office/drawing/2016/SVG/main" r:embed="rId7"/>
+              </a:ext>
+            </a:extLst>
+          </a:blip>
+          <a:srcRect l="19505" r="20468"/>
+          <a:stretch/>
+        </p:blipFill>
+        <p:spPr>
+          <a:xfrm>
+            <a:off x="3356044" y="3297424"/>
+            <a:ext cx="245881" cy="338517"/>
+          </a:xfrm>
+          <a:prstGeom prst="rect">
+            <a:avLst/>
+          </a:prstGeom>
+        </p:spPr>
+      </p:pic>
+      <p:pic>
+        <p:nvPicPr>
+          <p:cNvPr id="61" name="Gráfico 60" descr="Mapa con marcador con relleno sólido">
+            <a:extLst>
+              <a:ext uri="{FF2B5EF4-FFF2-40B4-BE49-F238E27FC236}">
+                <a16:creationId xmlns:a16="http://schemas.microsoft.com/office/drawing/2014/main" id="{F855B486-E559-48F1-AF1D-30B49F628F43}"/>
+              </a:ext>
+            </a:extLst>
+          </p:cNvPr>
+          <p:cNvPicPr>
+            <a:picLocks noChangeAspect="1"/>
+          </p:cNvPicPr>
+          <p:nvPr/>
+        </p:nvPicPr>
+        <p:blipFill>
+          <a:blip r:embed="rId13">
+            <a:extLst>
+              <a:ext uri="{28A0092B-C50C-407E-A947-70E740481C1C}">
+                <a14:useLocalDpi xmlns:a14="http://schemas.microsoft.com/office/drawing/2010/main" val="0"/>
+              </a:ext>
+              <a:ext uri="{96DAC541-7B7A-43D3-8B79-37D633B846F1}">
+                <asvg:svgBlip xmlns:asvg="http://schemas.microsoft.com/office/drawing/2016/SVG/main" r:embed="rId14"/>
+              </a:ext>
+            </a:extLst>
+          </a:blip>
+          <a:stretch>
+            <a:fillRect/>
+          </a:stretch>
+        </p:blipFill>
+        <p:spPr>
+          <a:xfrm>
+            <a:off x="5140968" y="2719758"/>
+            <a:ext cx="360000" cy="360000"/>
+          </a:xfrm>
+          <a:prstGeom prst="rect">
+            <a:avLst/>
+          </a:prstGeom>
+        </p:spPr>
+      </p:pic>
+      <p:pic>
+        <p:nvPicPr>
+          <p:cNvPr id="63" name="Gráfico 62">
+            <a:extLst>
+              <a:ext uri="{FF2B5EF4-FFF2-40B4-BE49-F238E27FC236}">
+                <a16:creationId xmlns:a16="http://schemas.microsoft.com/office/drawing/2014/main" id="{D3184ACD-4672-4568-94C5-1104D5CB1C3B}"/>
+              </a:ext>
+            </a:extLst>
+          </p:cNvPr>
+          <p:cNvPicPr>
+            <a:picLocks noChangeAspect="1"/>
+          </p:cNvPicPr>
+          <p:nvPr/>
+        </p:nvPicPr>
+        <p:blipFill>
+          <a:blip r:embed="rId15">
+            <a:extLst>
+              <a:ext uri="{28A0092B-C50C-407E-A947-70E740481C1C}">
+                <a14:useLocalDpi xmlns:a14="http://schemas.microsoft.com/office/drawing/2010/main" val="0"/>
+              </a:ext>
+              <a:ext uri="{96DAC541-7B7A-43D3-8B79-37D633B846F1}">
+                <asvg:svgBlip xmlns:asvg="http://schemas.microsoft.com/office/drawing/2016/SVG/main" r:embed="rId16"/>
+              </a:ext>
+            </a:extLst>
+          </a:blip>
+          <a:stretch>
+            <a:fillRect/>
+          </a:stretch>
+        </p:blipFill>
+        <p:spPr>
+          <a:xfrm>
+            <a:off x="7086582" y="4282371"/>
+            <a:ext cx="360000" cy="360000"/>
+          </a:xfrm>
+          <a:prstGeom prst="rect">
+            <a:avLst/>
+          </a:prstGeom>
+        </p:spPr>
+      </p:pic>
+      <p:pic>
+        <p:nvPicPr>
+          <p:cNvPr id="67" name="Gráfico 66">
+            <a:extLst>
+              <a:ext uri="{FF2B5EF4-FFF2-40B4-BE49-F238E27FC236}">
+                <a16:creationId xmlns:a16="http://schemas.microsoft.com/office/drawing/2014/main" id="{5F00DE6B-5C56-4F17-834B-4B63E48626CC}"/>
+              </a:ext>
+            </a:extLst>
+          </p:cNvPr>
+          <p:cNvPicPr>
+            <a:picLocks noChangeAspect="1"/>
+          </p:cNvPicPr>
+          <p:nvPr/>
+        </p:nvPicPr>
+        <p:blipFill>
+          <a:blip r:embed="rId17">
+            <a:extLst>
+              <a:ext uri="{28A0092B-C50C-407E-A947-70E740481C1C}">
+                <a14:useLocalDpi xmlns:a14="http://schemas.microsoft.com/office/drawing/2010/main" val="0"/>
+              </a:ext>
+              <a:ext uri="{96DAC541-7B7A-43D3-8B79-37D633B846F1}">
+                <asvg:svgBlip xmlns:asvg="http://schemas.microsoft.com/office/drawing/2016/SVG/main" r:embed="rId18"/>
+              </a:ext>
+            </a:extLst>
+          </a:blip>
+          <a:stretch>
+            <a:fillRect/>
+          </a:stretch>
+        </p:blipFill>
+        <p:spPr>
+          <a:xfrm>
+            <a:off x="9209376" y="2221137"/>
+            <a:ext cx="360000" cy="360000"/>
+          </a:xfrm>
+          <a:prstGeom prst="rect">
+            <a:avLst/>
+          </a:prstGeom>
+        </p:spPr>
+      </p:pic>
+      <p:pic>
+        <p:nvPicPr>
+          <p:cNvPr id="69" name="Gráfico 68">
+            <a:extLst>
+              <a:ext uri="{FF2B5EF4-FFF2-40B4-BE49-F238E27FC236}">
+                <a16:creationId xmlns:a16="http://schemas.microsoft.com/office/drawing/2014/main" id="{D00928FF-292C-4FFA-8C4D-DC17BE752352}"/>
+              </a:ext>
+            </a:extLst>
+          </p:cNvPr>
+          <p:cNvPicPr>
+            <a:picLocks noChangeAspect="1"/>
+          </p:cNvPicPr>
+          <p:nvPr/>
+        </p:nvPicPr>
+        <p:blipFill>
+          <a:blip r:embed="rId19">
+            <a:extLst>
+              <a:ext uri="{28A0092B-C50C-407E-A947-70E740481C1C}">
+                <a14:useLocalDpi xmlns:a14="http://schemas.microsoft.com/office/drawing/2010/main" val="0"/>
+              </a:ext>
+              <a:ext uri="{96DAC541-7B7A-43D3-8B79-37D633B846F1}">
+                <asvg:svgBlip xmlns:asvg="http://schemas.microsoft.com/office/drawing/2016/SVG/main" r:embed="rId20"/>
+              </a:ext>
+            </a:extLst>
+          </a:blip>
+          <a:stretch>
+            <a:fillRect/>
+          </a:stretch>
+        </p:blipFill>
+        <p:spPr>
+          <a:xfrm>
+            <a:off x="7081337" y="3763744"/>
+            <a:ext cx="360000" cy="360000"/>
+          </a:xfrm>
+          <a:prstGeom prst="rect">
+            <a:avLst/>
+          </a:prstGeom>
+        </p:spPr>
+      </p:pic>
+      <p:pic>
+        <p:nvPicPr>
+          <p:cNvPr id="71" name="Gráfico 70">
+            <a:extLst>
+              <a:ext uri="{FF2B5EF4-FFF2-40B4-BE49-F238E27FC236}">
+                <a16:creationId xmlns:a16="http://schemas.microsoft.com/office/drawing/2014/main" id="{807E427F-2968-4300-BE75-BD33A08DAAFA}"/>
+              </a:ext>
+            </a:extLst>
+          </p:cNvPr>
+          <p:cNvPicPr>
+            <a:picLocks noChangeAspect="1"/>
+          </p:cNvPicPr>
+          <p:nvPr/>
+        </p:nvPicPr>
+        <p:blipFill>
+          <a:blip r:embed="rId21">
+            <a:extLst>
+              <a:ext uri="{28A0092B-C50C-407E-A947-70E740481C1C}">
+                <a14:useLocalDpi xmlns:a14="http://schemas.microsoft.com/office/drawing/2010/main" val="0"/>
+              </a:ext>
+              <a:ext uri="{96DAC541-7B7A-43D3-8B79-37D633B846F1}">
+                <asvg:svgBlip xmlns:asvg="http://schemas.microsoft.com/office/drawing/2016/SVG/main" r:embed="rId22"/>
+              </a:ext>
+            </a:extLst>
+          </a:blip>
+          <a:stretch>
+            <a:fillRect/>
+          </a:stretch>
+        </p:blipFill>
+        <p:spPr>
+          <a:xfrm>
+            <a:off x="8184249" y="2690305"/>
+            <a:ext cx="360000" cy="360000"/>
+          </a:xfrm>
+          <a:prstGeom prst="rect">
+            <a:avLst/>
+          </a:prstGeom>
+        </p:spPr>
+      </p:pic>
+      <p:pic>
+        <p:nvPicPr>
+          <p:cNvPr id="73" name="Gráfico 72" descr="Hogar con relleno sólido">
+            <a:extLst>
+              <a:ext uri="{FF2B5EF4-FFF2-40B4-BE49-F238E27FC236}">
+                <a16:creationId xmlns:a16="http://schemas.microsoft.com/office/drawing/2014/main" id="{DC6590E4-E841-497D-AC89-DEE26C9444CD}"/>
+              </a:ext>
+            </a:extLst>
+          </p:cNvPr>
+          <p:cNvPicPr>
+            <a:picLocks noChangeAspect="1"/>
+          </p:cNvPicPr>
+          <p:nvPr/>
+        </p:nvPicPr>
+        <p:blipFill rotWithShape="1">
+          <a:blip r:embed="rId23">
+            <a:extLst>
+              <a:ext uri="{28A0092B-C50C-407E-A947-70E740481C1C}">
+                <a14:useLocalDpi xmlns:a14="http://schemas.microsoft.com/office/drawing/2010/main" val="0"/>
+              </a:ext>
+              <a:ext uri="{96DAC541-7B7A-43D3-8B79-37D633B846F1}">
+                <asvg:svgBlip xmlns:asvg="http://schemas.microsoft.com/office/drawing/2016/SVG/main" r:embed="rId24"/>
+              </a:ext>
+            </a:extLst>
+          </a:blip>
+          <a:srcRect l="5663" t="11774" r="5303" b="11146"/>
+          <a:stretch/>
+        </p:blipFill>
+        <p:spPr>
+          <a:xfrm>
+            <a:off x="9209376" y="1569614"/>
+            <a:ext cx="360000" cy="311658"/>
+          </a:xfrm>
+          <a:prstGeom prst="rect">
+            <a:avLst/>
+          </a:prstGeom>
+        </p:spPr>
+      </p:pic>
+      <p:pic>
+        <p:nvPicPr>
+          <p:cNvPr id="75" name="Gráfico 74">
+            <a:extLst>
+              <a:ext uri="{FF2B5EF4-FFF2-40B4-BE49-F238E27FC236}">
+                <a16:creationId xmlns:a16="http://schemas.microsoft.com/office/drawing/2014/main" id="{98EA5A54-648F-40CD-B3B9-283EF07E1142}"/>
+              </a:ext>
+            </a:extLst>
+          </p:cNvPr>
+          <p:cNvPicPr>
+            <a:picLocks noChangeAspect="1"/>
+          </p:cNvPicPr>
+          <p:nvPr/>
+        </p:nvPicPr>
+        <p:blipFill>
+          <a:blip r:embed="rId25">
+            <a:extLst>
+              <a:ext uri="{28A0092B-C50C-407E-A947-70E740481C1C}">
+                <a14:useLocalDpi xmlns:a14="http://schemas.microsoft.com/office/drawing/2010/main" val="0"/>
+              </a:ext>
+              <a:ext uri="{96DAC541-7B7A-43D3-8B79-37D633B846F1}">
+                <asvg:svgBlip xmlns:asvg="http://schemas.microsoft.com/office/drawing/2016/SVG/main" r:embed="rId26"/>
+              </a:ext>
+            </a:extLst>
+          </a:blip>
+          <a:stretch>
+            <a:fillRect/>
+          </a:stretch>
+        </p:blipFill>
+        <p:spPr>
+          <a:xfrm>
+            <a:off x="7081337" y="3232676"/>
+            <a:ext cx="360000" cy="360000"/>
+          </a:xfrm>
+          <a:prstGeom prst="rect">
+            <a:avLst/>
+          </a:prstGeom>
+        </p:spPr>
+      </p:pic>
+      <p:pic>
+        <p:nvPicPr>
+          <p:cNvPr id="77" name="Gráfico 76" descr="Calendario con relleno sólido">
+            <a:extLst>
+              <a:ext uri="{FF2B5EF4-FFF2-40B4-BE49-F238E27FC236}">
+                <a16:creationId xmlns:a16="http://schemas.microsoft.com/office/drawing/2014/main" id="{9993605E-8117-49FD-AD36-D9EA39D1506C}"/>
+              </a:ext>
+            </a:extLst>
+          </p:cNvPr>
+          <p:cNvPicPr>
+            <a:picLocks noChangeAspect="1"/>
+          </p:cNvPicPr>
+          <p:nvPr/>
+        </p:nvPicPr>
+        <p:blipFill rotWithShape="1">
+          <a:blip r:embed="rId27">
+            <a:extLst>
+              <a:ext uri="{28A0092B-C50C-407E-A947-70E740481C1C}">
+                <a14:useLocalDpi xmlns:a14="http://schemas.microsoft.com/office/drawing/2010/main" val="0"/>
+              </a:ext>
+              <a:ext uri="{96DAC541-7B7A-43D3-8B79-37D633B846F1}">
+                <asvg:svgBlip xmlns:asvg="http://schemas.microsoft.com/office/drawing/2016/SVG/main" r:embed="rId28"/>
+              </a:ext>
+            </a:extLst>
+          </a:blip>
+          <a:srcRect l="9439" t="10044" r="11888" b="8540"/>
+          <a:stretch/>
+        </p:blipFill>
+        <p:spPr>
+          <a:xfrm>
+            <a:off x="8606627" y="4923026"/>
+            <a:ext cx="719386" cy="744467"/>
+          </a:xfrm>
+          <a:prstGeom prst="rect">
+            <a:avLst/>
+          </a:prstGeom>
+        </p:spPr>
+      </p:pic>
     </p:spTree>
     <p:extLst>
       <p:ext uri="{BB962C8B-B14F-4D97-AF65-F5344CB8AC3E}">
         <p14:creationId xmlns:p14="http://schemas.microsoft.com/office/powerpoint/2010/main" val="567866022"/>
+      </p:ext>
+    </p:extLst>
+  </p:cSld>
+  <p:clrMapOvr>
+    <a:masterClrMapping/>
+  </p:clrMapOvr>
+</p:sld>
+</file>
+
+<file path=ppt/slides/slide2.xml><?xml version="1.0" encoding="utf-8"?>
+<p:sld xmlns:a="http://schemas.openxmlformats.org/drawingml/2006/main" xmlns:r="http://schemas.openxmlformats.org/officeDocument/2006/relationships" xmlns:p="http://schemas.openxmlformats.org/presentationml/2006/main">
+  <p:cSld>
+    <p:spTree>
+      <p:nvGrpSpPr>
+        <p:cNvPr id="1" name=""/>
+        <p:cNvGrpSpPr/>
+        <p:nvPr/>
+      </p:nvGrpSpPr>
+      <p:grpSpPr>
+        <a:xfrm>
+          <a:off x="0" y="0"/>
+          <a:ext cx="0" cy="0"/>
+          <a:chOff x="0" y="0"/>
+          <a:chExt cx="0" cy="0"/>
+        </a:xfrm>
+      </p:grpSpPr>
+      <p:pic>
+        <p:nvPicPr>
+          <p:cNvPr id="6" name="Gráfico 5" descr="Contorno de cara confundida con relleno sólido">
+            <a:extLst>
+              <a:ext uri="{FF2B5EF4-FFF2-40B4-BE49-F238E27FC236}">
+                <a16:creationId xmlns:a16="http://schemas.microsoft.com/office/drawing/2014/main" id="{0C5E3B67-41C1-4F6F-9A34-17A7ADD3A7C3}"/>
+              </a:ext>
+            </a:extLst>
+          </p:cNvPr>
+          <p:cNvPicPr>
+            <a:picLocks noChangeAspect="1"/>
+          </p:cNvPicPr>
+          <p:nvPr/>
+        </p:nvPicPr>
+        <p:blipFill>
+          <a:blip r:embed="rId2">
+            <a:extLst>
+              <a:ext uri="{28A0092B-C50C-407E-A947-70E740481C1C}">
+                <a14:useLocalDpi xmlns:a14="http://schemas.microsoft.com/office/drawing/2010/main" val="0"/>
+              </a:ext>
+              <a:ext uri="{96DAC541-7B7A-43D3-8B79-37D633B846F1}">
+                <asvg:svgBlip xmlns:asvg="http://schemas.microsoft.com/office/drawing/2016/SVG/main" r:embed="rId3"/>
+              </a:ext>
+            </a:extLst>
+          </a:blip>
+          <a:stretch>
+            <a:fillRect/>
+          </a:stretch>
+        </p:blipFill>
+        <p:spPr>
+          <a:xfrm>
+            <a:off x="9913763" y="1315908"/>
+            <a:ext cx="579600" cy="579600"/>
+          </a:xfrm>
+          <a:prstGeom prst="rect">
+            <a:avLst/>
+          </a:prstGeom>
+        </p:spPr>
+      </p:pic>
+      <p:grpSp>
+        <p:nvGrpSpPr>
+          <p:cNvPr id="13" name="Grupo 12">
+            <a:extLst>
+              <a:ext uri="{FF2B5EF4-FFF2-40B4-BE49-F238E27FC236}">
+                <a16:creationId xmlns:a16="http://schemas.microsoft.com/office/drawing/2014/main" id="{F00DF7CF-4E01-4C11-A625-FDEEF94F527F}"/>
+              </a:ext>
+            </a:extLst>
+          </p:cNvPr>
+          <p:cNvGrpSpPr/>
+          <p:nvPr/>
+        </p:nvGrpSpPr>
+        <p:grpSpPr>
+          <a:xfrm>
+            <a:off x="12585814" y="2436736"/>
+            <a:ext cx="1891616" cy="920607"/>
+            <a:chOff x="3694015" y="3057809"/>
+            <a:chExt cx="1891616" cy="920607"/>
+          </a:xfrm>
+        </p:grpSpPr>
+        <p:pic>
+          <p:nvPicPr>
+            <p:cNvPr id="14" name="Gráfico 13" descr="Cactus con relleno sólido">
+              <a:extLst>
+                <a:ext uri="{FF2B5EF4-FFF2-40B4-BE49-F238E27FC236}">
+                  <a16:creationId xmlns:a16="http://schemas.microsoft.com/office/drawing/2014/main" id="{D95DB21E-0BF5-479B-8D3D-2C3440681B6A}"/>
+                </a:ext>
+              </a:extLst>
+            </p:cNvPr>
+            <p:cNvPicPr>
+              <a:picLocks noChangeAspect="1"/>
+            </p:cNvPicPr>
+            <p:nvPr/>
+          </p:nvPicPr>
+          <p:blipFill rotWithShape="1">
+            <a:blip r:embed="rId4">
+              <a:extLst>
+                <a:ext uri="{28A0092B-C50C-407E-A947-70E740481C1C}">
+                  <a14:useLocalDpi xmlns:a14="http://schemas.microsoft.com/office/drawing/2010/main" val="0"/>
+                </a:ext>
+                <a:ext uri="{96DAC541-7B7A-43D3-8B79-37D633B846F1}">
+                  <asvg:svgBlip xmlns:asvg="http://schemas.microsoft.com/office/drawing/2016/SVG/main" r:embed="rId5"/>
+                </a:ext>
+              </a:extLst>
+            </a:blip>
+            <a:srcRect l="19505" r="20468"/>
+            <a:stretch/>
+          </p:blipFill>
+          <p:spPr>
+            <a:xfrm>
+              <a:off x="3962706" y="3057809"/>
+              <a:ext cx="245881" cy="338517"/>
+            </a:xfrm>
+            <a:prstGeom prst="rect">
+              <a:avLst/>
+            </a:prstGeom>
+          </p:spPr>
+        </p:pic>
+        <p:sp>
+          <p:nvSpPr>
+            <p:cNvPr id="15" name="Rectángulo 14">
+              <a:extLst>
+                <a:ext uri="{FF2B5EF4-FFF2-40B4-BE49-F238E27FC236}">
+                  <a16:creationId xmlns:a16="http://schemas.microsoft.com/office/drawing/2014/main" id="{70D35894-AB00-480B-A9B4-7EA929EDC55B}"/>
+                </a:ext>
+              </a:extLst>
+            </p:cNvPr>
+            <p:cNvSpPr/>
+            <p:nvPr/>
+          </p:nvSpPr>
+          <p:spPr>
+            <a:xfrm>
+              <a:off x="3694015" y="3233949"/>
+              <a:ext cx="1891616" cy="744467"/>
+            </a:xfrm>
+            <a:prstGeom prst="rect">
+              <a:avLst/>
+            </a:prstGeom>
+            <a:noFill/>
+            <a:ln>
+              <a:noFill/>
+            </a:ln>
+          </p:spPr>
+          <p:style>
+            <a:lnRef idx="2">
+              <a:schemeClr val="accent1">
+                <a:shade val="50000"/>
+              </a:schemeClr>
+            </a:lnRef>
+            <a:fillRef idx="1">
+              <a:schemeClr val="accent1"/>
+            </a:fillRef>
+            <a:effectRef idx="0">
+              <a:schemeClr val="accent1"/>
+            </a:effectRef>
+            <a:fontRef idx="minor">
+              <a:schemeClr val="lt1"/>
+            </a:fontRef>
+          </p:style>
+          <p:txBody>
+            <a:bodyPr rtlCol="0" anchor="ctr"/>
+            <a:lstStyle/>
+            <a:p>
+              <a:pPr algn="ctr"/>
+              <a:r>
+                <a:rPr lang="es-MX" sz="4000" b="1" dirty="0">
+                  <a:solidFill>
+                    <a:srgbClr val="FF3300"/>
+                  </a:solidFill>
+                  <a:latin typeface="Bahnschrift Condensed" panose="020B0502040204020203" pitchFamily="34" charset="0"/>
+                </a:rPr>
+                <a:t>El Arriero</a:t>
+              </a:r>
+            </a:p>
+          </p:txBody>
+        </p:sp>
+        <p:cxnSp>
+          <p:nvCxnSpPr>
+            <p:cNvPr id="16" name="Conector recto 15">
+              <a:extLst>
+                <a:ext uri="{FF2B5EF4-FFF2-40B4-BE49-F238E27FC236}">
+                  <a16:creationId xmlns:a16="http://schemas.microsoft.com/office/drawing/2014/main" id="{8506BEC7-617A-4D48-93E0-647F5AC360F9}"/>
+                </a:ext>
+              </a:extLst>
+            </p:cNvPr>
+            <p:cNvCxnSpPr>
+              <a:cxnSpLocks/>
+            </p:cNvCxnSpPr>
+            <p:nvPr/>
+          </p:nvCxnSpPr>
+          <p:spPr>
+            <a:xfrm>
+              <a:off x="3859211" y="3382471"/>
+              <a:ext cx="1566229" cy="0"/>
+            </a:xfrm>
+            <a:prstGeom prst="line">
+              <a:avLst/>
+            </a:prstGeom>
+            <a:ln w="19050">
+              <a:solidFill>
+                <a:srgbClr val="56423C"/>
+              </a:solidFill>
+            </a:ln>
+          </p:spPr>
+          <p:style>
+            <a:lnRef idx="1">
+              <a:schemeClr val="accent1"/>
+            </a:lnRef>
+            <a:fillRef idx="0">
+              <a:schemeClr val="accent1"/>
+            </a:fillRef>
+            <a:effectRef idx="0">
+              <a:schemeClr val="accent1"/>
+            </a:effectRef>
+            <a:fontRef idx="minor">
+              <a:schemeClr val="tx1"/>
+            </a:fontRef>
+          </p:style>
+        </p:cxnSp>
+        <p:sp>
+          <p:nvSpPr>
+            <p:cNvPr id="17" name="Rectángulo 16">
+              <a:extLst>
+                <a:ext uri="{FF2B5EF4-FFF2-40B4-BE49-F238E27FC236}">
+                  <a16:creationId xmlns:a16="http://schemas.microsoft.com/office/drawing/2014/main" id="{13FCC78B-6E1D-4A87-89AA-3269D4566857}"/>
+                </a:ext>
+              </a:extLst>
+            </p:cNvPr>
+            <p:cNvSpPr/>
+            <p:nvPr/>
+          </p:nvSpPr>
+          <p:spPr>
+            <a:xfrm>
+              <a:off x="4205699" y="3112756"/>
+              <a:ext cx="1321341" cy="262363"/>
+            </a:xfrm>
+            <a:prstGeom prst="rect">
+              <a:avLst/>
+            </a:prstGeom>
+            <a:noFill/>
+            <a:ln>
+              <a:noFill/>
+            </a:ln>
+          </p:spPr>
+          <p:style>
+            <a:lnRef idx="2">
+              <a:schemeClr val="accent1">
+                <a:shade val="50000"/>
+              </a:schemeClr>
+            </a:lnRef>
+            <a:fillRef idx="1">
+              <a:schemeClr val="accent1"/>
+            </a:fillRef>
+            <a:effectRef idx="0">
+              <a:schemeClr val="accent1"/>
+            </a:effectRef>
+            <a:fontRef idx="minor">
+              <a:schemeClr val="lt1"/>
+            </a:fontRef>
+          </p:style>
+          <p:txBody>
+            <a:bodyPr rtlCol="0" anchor="ctr"/>
+            <a:lstStyle/>
+            <a:p>
+              <a:pPr algn="r"/>
+              <a:r>
+                <a:rPr lang="es-MX" b="1" spc="30" dirty="0">
+                  <a:solidFill>
+                    <a:srgbClr val="56423C"/>
+                  </a:solidFill>
+                  <a:latin typeface="Bahnschrift Light SemiCondensed" panose="020B0502040204020203" pitchFamily="34" charset="0"/>
+                </a:rPr>
+                <a:t>Restaurante</a:t>
+              </a:r>
+            </a:p>
+          </p:txBody>
+        </p:sp>
+        <p:cxnSp>
+          <p:nvCxnSpPr>
+            <p:cNvPr id="18" name="Conector recto 17">
+              <a:extLst>
+                <a:ext uri="{FF2B5EF4-FFF2-40B4-BE49-F238E27FC236}">
+                  <a16:creationId xmlns:a16="http://schemas.microsoft.com/office/drawing/2014/main" id="{E6424D9E-62FF-4917-ABBC-CDF462A97A7C}"/>
+                </a:ext>
+              </a:extLst>
+            </p:cNvPr>
+            <p:cNvCxnSpPr>
+              <a:cxnSpLocks/>
+            </p:cNvCxnSpPr>
+            <p:nvPr/>
+          </p:nvCxnSpPr>
+          <p:spPr>
+            <a:xfrm>
+              <a:off x="3855303" y="3878169"/>
+              <a:ext cx="1566000" cy="0"/>
+            </a:xfrm>
+            <a:prstGeom prst="line">
+              <a:avLst/>
+            </a:prstGeom>
+            <a:ln w="19050">
+              <a:solidFill>
+                <a:srgbClr val="56423C"/>
+              </a:solidFill>
+            </a:ln>
+          </p:spPr>
+          <p:style>
+            <a:lnRef idx="1">
+              <a:schemeClr val="accent1"/>
+            </a:lnRef>
+            <a:fillRef idx="0">
+              <a:schemeClr val="accent1"/>
+            </a:fillRef>
+            <a:effectRef idx="0">
+              <a:schemeClr val="accent1"/>
+            </a:effectRef>
+            <a:fontRef idx="minor">
+              <a:schemeClr val="tx1"/>
+            </a:fontRef>
+          </p:style>
+        </p:cxnSp>
+      </p:grpSp>
+      <p:pic>
+        <p:nvPicPr>
+          <p:cNvPr id="19" name="Gráfico 18" descr="Cactus con relleno sólido">
+            <a:extLst>
+              <a:ext uri="{FF2B5EF4-FFF2-40B4-BE49-F238E27FC236}">
+                <a16:creationId xmlns:a16="http://schemas.microsoft.com/office/drawing/2014/main" id="{FC19599E-5582-4559-AE4A-4A77C8092BC6}"/>
+              </a:ext>
+            </a:extLst>
+          </p:cNvPr>
+          <p:cNvPicPr>
+            <a:picLocks noChangeAspect="1"/>
+          </p:cNvPicPr>
+          <p:nvPr/>
+        </p:nvPicPr>
+        <p:blipFill rotWithShape="1">
+          <a:blip r:embed="rId6">
+            <a:extLst>
+              <a:ext uri="{28A0092B-C50C-407E-A947-70E740481C1C}">
+                <a14:useLocalDpi xmlns:a14="http://schemas.microsoft.com/office/drawing/2010/main" val="0"/>
+              </a:ext>
+              <a:ext uri="{96DAC541-7B7A-43D3-8B79-37D633B846F1}">
+                <asvg:svgBlip xmlns:asvg="http://schemas.microsoft.com/office/drawing/2016/SVG/main" r:embed="rId7"/>
+              </a:ext>
+            </a:extLst>
+          </a:blip>
+          <a:srcRect l="19505" r="20468"/>
+          <a:stretch/>
+        </p:blipFill>
+        <p:spPr>
+          <a:xfrm>
+            <a:off x="11266425" y="2113332"/>
+            <a:ext cx="442963" cy="609850"/>
+          </a:xfrm>
+          <a:prstGeom prst="rect">
+            <a:avLst/>
+          </a:prstGeom>
+        </p:spPr>
+      </p:pic>
+      <p:sp>
+        <p:nvSpPr>
+          <p:cNvPr id="22" name="Rectángulo: esquinas diagonales redondeadas 21">
+            <a:extLst>
+              <a:ext uri="{FF2B5EF4-FFF2-40B4-BE49-F238E27FC236}">
+                <a16:creationId xmlns:a16="http://schemas.microsoft.com/office/drawing/2014/main" id="{95EBFEC9-5440-44D4-8A23-9B9DF1220482}"/>
+              </a:ext>
+            </a:extLst>
+          </p:cNvPr>
+          <p:cNvSpPr/>
+          <p:nvPr/>
+        </p:nvSpPr>
+        <p:spPr>
+          <a:xfrm>
+            <a:off x="1118869" y="487681"/>
+            <a:ext cx="3042420" cy="1872342"/>
+          </a:xfrm>
+          <a:prstGeom prst="round2DiagRect">
+            <a:avLst>
+              <a:gd name="adj1" fmla="val 11163"/>
+              <a:gd name="adj2" fmla="val 10233"/>
+            </a:avLst>
+          </a:prstGeom>
+          <a:solidFill>
+            <a:schemeClr val="bg1"/>
+          </a:solidFill>
+          <a:ln w="38100">
+            <a:noFill/>
+          </a:ln>
+          <a:effectLst>
+            <a:outerShdw blurRad="50800" dist="38100" dir="8100000" algn="tr" rotWithShape="0">
+              <a:prstClr val="black">
+                <a:alpha val="40000"/>
+              </a:prstClr>
+            </a:outerShdw>
+          </a:effectLst>
+        </p:spPr>
+        <p:style>
+          <a:lnRef idx="2">
+            <a:schemeClr val="accent1">
+              <a:shade val="50000"/>
+            </a:schemeClr>
+          </a:lnRef>
+          <a:fillRef idx="1">
+            <a:schemeClr val="accent1"/>
+          </a:fillRef>
+          <a:effectRef idx="0">
+            <a:schemeClr val="accent1"/>
+          </a:effectRef>
+          <a:fontRef idx="minor">
+            <a:schemeClr val="lt1"/>
+          </a:fontRef>
+        </p:style>
+        <p:txBody>
+          <a:bodyPr rtlCol="0" anchor="ctr"/>
+          <a:lstStyle/>
+          <a:p>
+            <a:pPr algn="ctr"/>
+            <a:endParaRPr lang="es-MX"/>
+          </a:p>
+        </p:txBody>
+      </p:sp>
+      <p:pic>
+        <p:nvPicPr>
+          <p:cNvPr id="23" name="Gráfico 22" descr="Contorno de cara confundida con relleno sólido">
+            <a:extLst>
+              <a:ext uri="{FF2B5EF4-FFF2-40B4-BE49-F238E27FC236}">
+                <a16:creationId xmlns:a16="http://schemas.microsoft.com/office/drawing/2014/main" id="{2CE25B71-64D1-4EDC-AFBC-BE98617C4922}"/>
+              </a:ext>
+            </a:extLst>
+          </p:cNvPr>
+          <p:cNvPicPr>
+            <a:picLocks noChangeAspect="1"/>
+          </p:cNvPicPr>
+          <p:nvPr/>
+        </p:nvPicPr>
+        <p:blipFill>
+          <a:blip r:embed="rId2">
+            <a:extLst>
+              <a:ext uri="{28A0092B-C50C-407E-A947-70E740481C1C}">
+                <a14:useLocalDpi xmlns:a14="http://schemas.microsoft.com/office/drawing/2010/main" val="0"/>
+              </a:ext>
+              <a:ext uri="{96DAC541-7B7A-43D3-8B79-37D633B846F1}">
+                <asvg:svgBlip xmlns:asvg="http://schemas.microsoft.com/office/drawing/2016/SVG/main" r:embed="rId3"/>
+              </a:ext>
+            </a:extLst>
+          </a:blip>
+          <a:stretch>
+            <a:fillRect/>
+          </a:stretch>
+        </p:blipFill>
+        <p:spPr>
+          <a:xfrm>
+            <a:off x="10447747" y="2695309"/>
+            <a:ext cx="579600" cy="579600"/>
+          </a:xfrm>
+          <a:prstGeom prst="rect">
+            <a:avLst/>
+          </a:prstGeom>
+        </p:spPr>
+      </p:pic>
+      <p:sp>
+        <p:nvSpPr>
+          <p:cNvPr id="24" name="Rectángulo 23">
+            <a:extLst>
+              <a:ext uri="{FF2B5EF4-FFF2-40B4-BE49-F238E27FC236}">
+                <a16:creationId xmlns:a16="http://schemas.microsoft.com/office/drawing/2014/main" id="{C17F392A-7330-41A1-A045-E828F07D99DC}"/>
+              </a:ext>
+            </a:extLst>
+          </p:cNvPr>
+          <p:cNvSpPr/>
+          <p:nvPr/>
+        </p:nvSpPr>
+        <p:spPr>
+          <a:xfrm>
+            <a:off x="1240765" y="700836"/>
+            <a:ext cx="2825040" cy="1097448"/>
+          </a:xfrm>
+          <a:prstGeom prst="rect">
+            <a:avLst/>
+          </a:prstGeom>
+          <a:noFill/>
+          <a:ln>
+            <a:noFill/>
+          </a:ln>
+        </p:spPr>
+        <p:style>
+          <a:lnRef idx="2">
+            <a:schemeClr val="accent1">
+              <a:shade val="50000"/>
+            </a:schemeClr>
+          </a:lnRef>
+          <a:fillRef idx="1">
+            <a:schemeClr val="accent1"/>
+          </a:fillRef>
+          <a:effectRef idx="0">
+            <a:schemeClr val="accent1"/>
+          </a:effectRef>
+          <a:fontRef idx="minor">
+            <a:schemeClr val="lt1"/>
+          </a:fontRef>
+        </p:style>
+        <p:txBody>
+          <a:bodyPr rtlCol="0" anchor="ctr"/>
+          <a:lstStyle/>
+          <a:p>
+            <a:r>
+              <a:rPr lang="es-MX" sz="1400" i="1" dirty="0">
+                <a:solidFill>
+                  <a:srgbClr val="56423C"/>
+                </a:solidFill>
+              </a:rPr>
+              <a:t>“Text </a:t>
+            </a:r>
+            <a:r>
+              <a:rPr lang="es-MX" sz="1400" i="1" dirty="0" err="1">
+                <a:solidFill>
+                  <a:srgbClr val="56423C"/>
+                </a:solidFill>
+              </a:rPr>
+              <a:t>text</a:t>
+            </a:r>
+            <a:r>
+              <a:rPr lang="es-MX" sz="1400" i="1" dirty="0">
+                <a:solidFill>
+                  <a:srgbClr val="56423C"/>
+                </a:solidFill>
+              </a:rPr>
+              <a:t> Text </a:t>
+            </a:r>
+            <a:r>
+              <a:rPr lang="es-MX" sz="1400" i="1" dirty="0" err="1">
+                <a:solidFill>
+                  <a:srgbClr val="56423C"/>
+                </a:solidFill>
+              </a:rPr>
+              <a:t>text</a:t>
+            </a:r>
+            <a:r>
+              <a:rPr lang="es-MX" sz="1400" i="1" dirty="0">
+                <a:solidFill>
+                  <a:srgbClr val="56423C"/>
+                </a:solidFill>
+              </a:rPr>
+              <a:t> Text </a:t>
+            </a:r>
+            <a:r>
+              <a:rPr lang="es-MX" sz="1400" i="1" dirty="0" err="1">
+                <a:solidFill>
+                  <a:srgbClr val="56423C"/>
+                </a:solidFill>
+              </a:rPr>
+              <a:t>text</a:t>
+            </a:r>
+            <a:r>
+              <a:rPr lang="es-MX" sz="1400" i="1" dirty="0">
+                <a:solidFill>
+                  <a:srgbClr val="56423C"/>
+                </a:solidFill>
+              </a:rPr>
+              <a:t> Text </a:t>
+            </a:r>
+            <a:r>
+              <a:rPr lang="es-MX" sz="1400" i="1" dirty="0" err="1">
+                <a:solidFill>
+                  <a:srgbClr val="56423C"/>
+                </a:solidFill>
+              </a:rPr>
+              <a:t>text</a:t>
+            </a:r>
+            <a:r>
+              <a:rPr lang="es-MX" sz="1400" i="1" dirty="0">
+                <a:solidFill>
+                  <a:srgbClr val="56423C"/>
+                </a:solidFill>
+              </a:rPr>
+              <a:t> Text” </a:t>
+            </a:r>
+          </a:p>
+        </p:txBody>
+      </p:sp>
+      <p:sp>
+        <p:nvSpPr>
+          <p:cNvPr id="25" name="Rectángulo 24">
+            <a:extLst>
+              <a:ext uri="{FF2B5EF4-FFF2-40B4-BE49-F238E27FC236}">
+                <a16:creationId xmlns:a16="http://schemas.microsoft.com/office/drawing/2014/main" id="{DBD22AA6-8269-40B6-922A-DF41F87BEF00}"/>
+              </a:ext>
+            </a:extLst>
+          </p:cNvPr>
+          <p:cNvSpPr/>
+          <p:nvPr/>
+        </p:nvSpPr>
+        <p:spPr>
+          <a:xfrm>
+            <a:off x="1286878" y="1933057"/>
+            <a:ext cx="1212481" cy="276839"/>
+          </a:xfrm>
+          <a:prstGeom prst="rect">
+            <a:avLst/>
+          </a:prstGeom>
+          <a:noFill/>
+          <a:ln>
+            <a:noFill/>
+          </a:ln>
+        </p:spPr>
+        <p:style>
+          <a:lnRef idx="2">
+            <a:schemeClr val="accent1">
+              <a:shade val="50000"/>
+            </a:schemeClr>
+          </a:lnRef>
+          <a:fillRef idx="1">
+            <a:schemeClr val="accent1"/>
+          </a:fillRef>
+          <a:effectRef idx="0">
+            <a:schemeClr val="accent1"/>
+          </a:effectRef>
+          <a:fontRef idx="minor">
+            <a:schemeClr val="lt1"/>
+          </a:fontRef>
+        </p:style>
+        <p:txBody>
+          <a:bodyPr rtlCol="0" anchor="ctr"/>
+          <a:lstStyle/>
+          <a:p>
+            <a:r>
+              <a:rPr lang="es-MX" sz="1600" b="1" dirty="0">
+                <a:solidFill>
+                  <a:srgbClr val="009900"/>
+                </a:solidFill>
+              </a:rPr>
+              <a:t>John </a:t>
+            </a:r>
+            <a:r>
+              <a:rPr lang="es-MX" sz="1600" b="1" dirty="0" err="1">
+                <a:solidFill>
+                  <a:srgbClr val="009900"/>
+                </a:solidFill>
+              </a:rPr>
+              <a:t>Doe</a:t>
+            </a:r>
+            <a:endParaRPr lang="es-MX" sz="1600" b="1" dirty="0">
+              <a:solidFill>
+                <a:srgbClr val="009900"/>
+              </a:solidFill>
+            </a:endParaRPr>
+          </a:p>
+        </p:txBody>
+      </p:sp>
+      <p:pic>
+        <p:nvPicPr>
+          <p:cNvPr id="28" name="Gráfico 27" descr="Cara riendo con relleno sólido con relleno sólido">
+            <a:extLst>
+              <a:ext uri="{FF2B5EF4-FFF2-40B4-BE49-F238E27FC236}">
+                <a16:creationId xmlns:a16="http://schemas.microsoft.com/office/drawing/2014/main" id="{1479479C-44EB-4F3A-919C-844299EA6286}"/>
+              </a:ext>
+            </a:extLst>
+          </p:cNvPr>
+          <p:cNvPicPr>
+            <a:picLocks noChangeAspect="1"/>
+          </p:cNvPicPr>
+          <p:nvPr/>
+        </p:nvPicPr>
+        <p:blipFill>
+          <a:blip r:embed="rId8">
+            <a:extLst>
+              <a:ext uri="{28A0092B-C50C-407E-A947-70E740481C1C}">
+                <a14:useLocalDpi xmlns:a14="http://schemas.microsoft.com/office/drawing/2010/main" val="0"/>
+              </a:ext>
+              <a:ext uri="{96DAC541-7B7A-43D3-8B79-37D633B846F1}">
+                <asvg:svgBlip xmlns:asvg="http://schemas.microsoft.com/office/drawing/2016/SVG/main" r:embed="rId9"/>
+              </a:ext>
+            </a:extLst>
+          </a:blip>
+          <a:stretch>
+            <a:fillRect/>
+          </a:stretch>
+        </p:blipFill>
+        <p:spPr>
+          <a:xfrm>
+            <a:off x="2168059" y="2578572"/>
+            <a:ext cx="449374" cy="449374"/>
+          </a:xfrm>
+          <a:prstGeom prst="rect">
+            <a:avLst/>
+          </a:prstGeom>
+        </p:spPr>
+      </p:pic>
+      <p:pic>
+        <p:nvPicPr>
+          <p:cNvPr id="35" name="Gráfico 34" descr="Cara riendo con relleno sólido con relleno sólido">
+            <a:extLst>
+              <a:ext uri="{FF2B5EF4-FFF2-40B4-BE49-F238E27FC236}">
+                <a16:creationId xmlns:a16="http://schemas.microsoft.com/office/drawing/2014/main" id="{E6D47805-D55D-4AE0-82C3-C53D299819F0}"/>
+              </a:ext>
+            </a:extLst>
+          </p:cNvPr>
+          <p:cNvPicPr>
+            <a:picLocks noChangeAspect="1"/>
+          </p:cNvPicPr>
+          <p:nvPr/>
+        </p:nvPicPr>
+        <p:blipFill>
+          <a:blip r:embed="rId8">
+            <a:extLst>
+              <a:ext uri="{28A0092B-C50C-407E-A947-70E740481C1C}">
+                <a14:useLocalDpi xmlns:a14="http://schemas.microsoft.com/office/drawing/2010/main" val="0"/>
+              </a:ext>
+              <a:ext uri="{96DAC541-7B7A-43D3-8B79-37D633B846F1}">
+                <asvg:svgBlip xmlns:asvg="http://schemas.microsoft.com/office/drawing/2016/SVG/main" r:embed="rId9"/>
+              </a:ext>
+            </a:extLst>
+          </a:blip>
+          <a:stretch>
+            <a:fillRect/>
+          </a:stretch>
+        </p:blipFill>
+        <p:spPr>
+          <a:xfrm>
+            <a:off x="12609485" y="1852783"/>
+            <a:ext cx="449374" cy="449374"/>
+          </a:xfrm>
+          <a:prstGeom prst="rect">
+            <a:avLst/>
+          </a:prstGeom>
+        </p:spPr>
+      </p:pic>
+      <p:pic>
+        <p:nvPicPr>
+          <p:cNvPr id="37" name="Gráfico 36" descr="Cara enfadada con relleno sólido con relleno sólido">
+            <a:extLst>
+              <a:ext uri="{FF2B5EF4-FFF2-40B4-BE49-F238E27FC236}">
+                <a16:creationId xmlns:a16="http://schemas.microsoft.com/office/drawing/2014/main" id="{8B51E3E1-53FD-4DCB-A39E-9CC02F179D6C}"/>
+              </a:ext>
+            </a:extLst>
+          </p:cNvPr>
+          <p:cNvPicPr>
+            <a:picLocks noChangeAspect="1"/>
+          </p:cNvPicPr>
+          <p:nvPr/>
+        </p:nvPicPr>
+        <p:blipFill>
+          <a:blip r:embed="rId10">
+            <a:extLst>
+              <a:ext uri="{28A0092B-C50C-407E-A947-70E740481C1C}">
+                <a14:useLocalDpi xmlns:a14="http://schemas.microsoft.com/office/drawing/2010/main" val="0"/>
+              </a:ext>
+              <a:ext uri="{96DAC541-7B7A-43D3-8B79-37D633B846F1}">
+                <asvg:svgBlip xmlns:asvg="http://schemas.microsoft.com/office/drawing/2016/SVG/main" r:embed="rId11"/>
+              </a:ext>
+            </a:extLst>
+          </a:blip>
+          <a:stretch>
+            <a:fillRect/>
+          </a:stretch>
+        </p:blipFill>
+        <p:spPr>
+          <a:xfrm>
+            <a:off x="12669642" y="2342019"/>
+            <a:ext cx="914400" cy="914400"/>
+          </a:xfrm>
+          <a:prstGeom prst="rect">
+            <a:avLst/>
+          </a:prstGeom>
+        </p:spPr>
+      </p:pic>
+      <p:pic>
+        <p:nvPicPr>
+          <p:cNvPr id="39" name="Gráfico 38" descr="Cara con ojos de estrella con relleno sólido con relleno sólido">
+            <a:extLst>
+              <a:ext uri="{FF2B5EF4-FFF2-40B4-BE49-F238E27FC236}">
+                <a16:creationId xmlns:a16="http://schemas.microsoft.com/office/drawing/2014/main" id="{DEFE08B2-92AC-45C7-8354-5F0E6E2FC037}"/>
+              </a:ext>
+            </a:extLst>
+          </p:cNvPr>
+          <p:cNvPicPr>
+            <a:picLocks noChangeAspect="1"/>
+          </p:cNvPicPr>
+          <p:nvPr/>
+        </p:nvPicPr>
+        <p:blipFill>
+          <a:blip r:embed="rId12">
+            <a:extLst>
+              <a:ext uri="{28A0092B-C50C-407E-A947-70E740481C1C}">
+                <a14:useLocalDpi xmlns:a14="http://schemas.microsoft.com/office/drawing/2010/main" val="0"/>
+              </a:ext>
+              <a:ext uri="{96DAC541-7B7A-43D3-8B79-37D633B846F1}">
+                <asvg:svgBlip xmlns:asvg="http://schemas.microsoft.com/office/drawing/2016/SVG/main" r:embed="rId13"/>
+              </a:ext>
+            </a:extLst>
+          </a:blip>
+          <a:stretch>
+            <a:fillRect/>
+          </a:stretch>
+        </p:blipFill>
+        <p:spPr>
+          <a:xfrm>
+            <a:off x="10652629" y="1852783"/>
+            <a:ext cx="450000" cy="450000"/>
+          </a:xfrm>
+          <a:prstGeom prst="rect">
+            <a:avLst/>
+          </a:prstGeom>
+        </p:spPr>
+      </p:pic>
+      <p:cxnSp>
+        <p:nvCxnSpPr>
+          <p:cNvPr id="43" name="Conector recto 42">
+            <a:extLst>
+              <a:ext uri="{FF2B5EF4-FFF2-40B4-BE49-F238E27FC236}">
+                <a16:creationId xmlns:a16="http://schemas.microsoft.com/office/drawing/2014/main" id="{CC5683CF-1EBA-4CE3-8272-0CDF11AB7F52}"/>
+              </a:ext>
+            </a:extLst>
+          </p:cNvPr>
+          <p:cNvCxnSpPr>
+            <a:cxnSpLocks/>
+          </p:cNvCxnSpPr>
+          <p:nvPr/>
+        </p:nvCxnSpPr>
+        <p:spPr>
+          <a:xfrm>
+            <a:off x="1374771" y="2212860"/>
+            <a:ext cx="323696" cy="0"/>
+          </a:xfrm>
+          <a:prstGeom prst="line">
+            <a:avLst/>
+          </a:prstGeom>
+          <a:ln w="28575">
+            <a:solidFill>
+              <a:srgbClr val="FF3300"/>
+            </a:solidFill>
+          </a:ln>
+        </p:spPr>
+        <p:style>
+          <a:lnRef idx="1">
+            <a:schemeClr val="accent1"/>
+          </a:lnRef>
+          <a:fillRef idx="0">
+            <a:schemeClr val="accent1"/>
+          </a:fillRef>
+          <a:effectRef idx="0">
+            <a:schemeClr val="accent1"/>
+          </a:effectRef>
+          <a:fontRef idx="minor">
+            <a:schemeClr val="tx1"/>
+          </a:fontRef>
+        </p:style>
+      </p:cxnSp>
+      <p:sp>
+        <p:nvSpPr>
+          <p:cNvPr id="46" name="Rectángulo: esquinas diagonales redondeadas 45">
+            <a:extLst>
+              <a:ext uri="{FF2B5EF4-FFF2-40B4-BE49-F238E27FC236}">
+                <a16:creationId xmlns:a16="http://schemas.microsoft.com/office/drawing/2014/main" id="{0AA4A48C-F9B9-4267-8D1C-9A3E0178E8FA}"/>
+              </a:ext>
+            </a:extLst>
+          </p:cNvPr>
+          <p:cNvSpPr/>
+          <p:nvPr/>
+        </p:nvSpPr>
+        <p:spPr>
+          <a:xfrm>
+            <a:off x="4274221" y="487681"/>
+            <a:ext cx="3042420" cy="1872342"/>
+          </a:xfrm>
+          <a:prstGeom prst="round2DiagRect">
+            <a:avLst>
+              <a:gd name="adj1" fmla="val 0"/>
+              <a:gd name="adj2" fmla="val 0"/>
+            </a:avLst>
+          </a:prstGeom>
+          <a:solidFill>
+            <a:schemeClr val="bg1"/>
+          </a:solidFill>
+          <a:ln w="38100">
+            <a:noFill/>
+          </a:ln>
+          <a:effectLst>
+            <a:outerShdw blurRad="50800" dist="38100" dir="8100000" algn="tr" rotWithShape="0">
+              <a:prstClr val="black">
+                <a:alpha val="40000"/>
+              </a:prstClr>
+            </a:outerShdw>
+          </a:effectLst>
+        </p:spPr>
+        <p:style>
+          <a:lnRef idx="2">
+            <a:schemeClr val="accent1">
+              <a:shade val="50000"/>
+            </a:schemeClr>
+          </a:lnRef>
+          <a:fillRef idx="1">
+            <a:schemeClr val="accent1"/>
+          </a:fillRef>
+          <a:effectRef idx="0">
+            <a:schemeClr val="accent1"/>
+          </a:effectRef>
+          <a:fontRef idx="minor">
+            <a:schemeClr val="lt1"/>
+          </a:fontRef>
+        </p:style>
+        <p:txBody>
+          <a:bodyPr rtlCol="0" anchor="ctr"/>
+          <a:lstStyle/>
+          <a:p>
+            <a:pPr algn="ctr"/>
+            <a:endParaRPr lang="es-MX"/>
+          </a:p>
+        </p:txBody>
+      </p:sp>
+      <p:sp>
+        <p:nvSpPr>
+          <p:cNvPr id="47" name="Rectángulo 46">
+            <a:extLst>
+              <a:ext uri="{FF2B5EF4-FFF2-40B4-BE49-F238E27FC236}">
+                <a16:creationId xmlns:a16="http://schemas.microsoft.com/office/drawing/2014/main" id="{652DEAB2-3C5B-4CEF-8C3E-E772046B3C0C}"/>
+              </a:ext>
+            </a:extLst>
+          </p:cNvPr>
+          <p:cNvSpPr/>
+          <p:nvPr/>
+        </p:nvSpPr>
+        <p:spPr>
+          <a:xfrm>
+            <a:off x="4396117" y="700836"/>
+            <a:ext cx="2825040" cy="1097448"/>
+          </a:xfrm>
+          <a:prstGeom prst="rect">
+            <a:avLst/>
+          </a:prstGeom>
+          <a:noFill/>
+          <a:ln>
+            <a:noFill/>
+          </a:ln>
+        </p:spPr>
+        <p:style>
+          <a:lnRef idx="2">
+            <a:schemeClr val="accent1">
+              <a:shade val="50000"/>
+            </a:schemeClr>
+          </a:lnRef>
+          <a:fillRef idx="1">
+            <a:schemeClr val="accent1"/>
+          </a:fillRef>
+          <a:effectRef idx="0">
+            <a:schemeClr val="accent1"/>
+          </a:effectRef>
+          <a:fontRef idx="minor">
+            <a:schemeClr val="lt1"/>
+          </a:fontRef>
+        </p:style>
+        <p:txBody>
+          <a:bodyPr rtlCol="0" anchor="ctr"/>
+          <a:lstStyle/>
+          <a:p>
+            <a:r>
+              <a:rPr lang="es-MX" sz="1400" i="1" dirty="0">
+                <a:solidFill>
+                  <a:srgbClr val="56423C"/>
+                </a:solidFill>
+              </a:rPr>
+              <a:t>“Text </a:t>
+            </a:r>
+            <a:r>
+              <a:rPr lang="es-MX" sz="1400" i="1" dirty="0" err="1">
+                <a:solidFill>
+                  <a:srgbClr val="56423C"/>
+                </a:solidFill>
+              </a:rPr>
+              <a:t>text</a:t>
+            </a:r>
+            <a:r>
+              <a:rPr lang="es-MX" sz="1400" i="1" dirty="0">
+                <a:solidFill>
+                  <a:srgbClr val="56423C"/>
+                </a:solidFill>
+              </a:rPr>
+              <a:t> Text </a:t>
+            </a:r>
+            <a:r>
+              <a:rPr lang="es-MX" sz="1400" i="1" dirty="0" err="1">
+                <a:solidFill>
+                  <a:srgbClr val="56423C"/>
+                </a:solidFill>
+              </a:rPr>
+              <a:t>text</a:t>
+            </a:r>
+            <a:r>
+              <a:rPr lang="es-MX" sz="1400" i="1" dirty="0">
+                <a:solidFill>
+                  <a:srgbClr val="56423C"/>
+                </a:solidFill>
+              </a:rPr>
+              <a:t> Text </a:t>
+            </a:r>
+            <a:r>
+              <a:rPr lang="es-MX" sz="1400" i="1" dirty="0" err="1">
+                <a:solidFill>
+                  <a:srgbClr val="56423C"/>
+                </a:solidFill>
+              </a:rPr>
+              <a:t>text</a:t>
+            </a:r>
+            <a:r>
+              <a:rPr lang="es-MX" sz="1400" i="1" dirty="0">
+                <a:solidFill>
+                  <a:srgbClr val="56423C"/>
+                </a:solidFill>
+              </a:rPr>
+              <a:t> Text </a:t>
+            </a:r>
+            <a:r>
+              <a:rPr lang="es-MX" sz="1400" i="1" dirty="0" err="1">
+                <a:solidFill>
+                  <a:srgbClr val="56423C"/>
+                </a:solidFill>
+              </a:rPr>
+              <a:t>text</a:t>
+            </a:r>
+            <a:r>
+              <a:rPr lang="es-MX" sz="1400" i="1" dirty="0">
+                <a:solidFill>
+                  <a:srgbClr val="56423C"/>
+                </a:solidFill>
+              </a:rPr>
+              <a:t> Text” </a:t>
+            </a:r>
+          </a:p>
+        </p:txBody>
+      </p:sp>
+      <p:sp>
+        <p:nvSpPr>
+          <p:cNvPr id="48" name="Rectángulo 47">
+            <a:extLst>
+              <a:ext uri="{FF2B5EF4-FFF2-40B4-BE49-F238E27FC236}">
+                <a16:creationId xmlns:a16="http://schemas.microsoft.com/office/drawing/2014/main" id="{3FB4203E-B325-4025-A5DA-C2C7076381D5}"/>
+              </a:ext>
+            </a:extLst>
+          </p:cNvPr>
+          <p:cNvSpPr/>
+          <p:nvPr/>
+        </p:nvSpPr>
+        <p:spPr>
+          <a:xfrm>
+            <a:off x="4442230" y="1933057"/>
+            <a:ext cx="1212481" cy="276839"/>
+          </a:xfrm>
+          <a:prstGeom prst="rect">
+            <a:avLst/>
+          </a:prstGeom>
+          <a:noFill/>
+          <a:ln>
+            <a:noFill/>
+          </a:ln>
+        </p:spPr>
+        <p:style>
+          <a:lnRef idx="2">
+            <a:schemeClr val="accent1">
+              <a:shade val="50000"/>
+            </a:schemeClr>
+          </a:lnRef>
+          <a:fillRef idx="1">
+            <a:schemeClr val="accent1"/>
+          </a:fillRef>
+          <a:effectRef idx="0">
+            <a:schemeClr val="accent1"/>
+          </a:effectRef>
+          <a:fontRef idx="minor">
+            <a:schemeClr val="lt1"/>
+          </a:fontRef>
+        </p:style>
+        <p:txBody>
+          <a:bodyPr rtlCol="0" anchor="ctr"/>
+          <a:lstStyle/>
+          <a:p>
+            <a:r>
+              <a:rPr lang="es-MX" sz="1600" b="1" dirty="0">
+                <a:solidFill>
+                  <a:srgbClr val="009900"/>
+                </a:solidFill>
+              </a:rPr>
+              <a:t>John </a:t>
+            </a:r>
+            <a:r>
+              <a:rPr lang="es-MX" sz="1600" b="1" dirty="0" err="1">
+                <a:solidFill>
+                  <a:srgbClr val="009900"/>
+                </a:solidFill>
+              </a:rPr>
+              <a:t>Doe</a:t>
+            </a:r>
+            <a:endParaRPr lang="es-MX" sz="1600" b="1" dirty="0">
+              <a:solidFill>
+                <a:srgbClr val="009900"/>
+              </a:solidFill>
+            </a:endParaRPr>
+          </a:p>
+        </p:txBody>
+      </p:sp>
+      <p:cxnSp>
+        <p:nvCxnSpPr>
+          <p:cNvPr id="50" name="Conector recto 49">
+            <a:extLst>
+              <a:ext uri="{FF2B5EF4-FFF2-40B4-BE49-F238E27FC236}">
+                <a16:creationId xmlns:a16="http://schemas.microsoft.com/office/drawing/2014/main" id="{349EDACC-5FBB-40A2-A80F-8DF838A2809F}"/>
+              </a:ext>
+            </a:extLst>
+          </p:cNvPr>
+          <p:cNvCxnSpPr>
+            <a:cxnSpLocks/>
+          </p:cNvCxnSpPr>
+          <p:nvPr/>
+        </p:nvCxnSpPr>
+        <p:spPr>
+          <a:xfrm>
+            <a:off x="4530123" y="2212860"/>
+            <a:ext cx="323696" cy="0"/>
+          </a:xfrm>
+          <a:prstGeom prst="line">
+            <a:avLst/>
+          </a:prstGeom>
+          <a:ln w="28575">
+            <a:solidFill>
+              <a:srgbClr val="FF3300"/>
+            </a:solidFill>
+          </a:ln>
+        </p:spPr>
+        <p:style>
+          <a:lnRef idx="1">
+            <a:schemeClr val="accent1"/>
+          </a:lnRef>
+          <a:fillRef idx="0">
+            <a:schemeClr val="accent1"/>
+          </a:fillRef>
+          <a:effectRef idx="0">
+            <a:schemeClr val="accent1"/>
+          </a:effectRef>
+          <a:fontRef idx="minor">
+            <a:schemeClr val="tx1"/>
+          </a:fontRef>
+        </p:style>
+      </p:cxnSp>
+      <p:pic>
+        <p:nvPicPr>
+          <p:cNvPr id="41" name="Gráfico 40" descr="Cara confundida con relleno sólido con relleno sólido">
+            <a:extLst>
+              <a:ext uri="{FF2B5EF4-FFF2-40B4-BE49-F238E27FC236}">
+                <a16:creationId xmlns:a16="http://schemas.microsoft.com/office/drawing/2014/main" id="{96866DCA-42C4-4AAF-80E9-46DDB9AF1665}"/>
+              </a:ext>
+            </a:extLst>
+          </p:cNvPr>
+          <p:cNvPicPr>
+            <a:picLocks noChangeAspect="1"/>
+          </p:cNvPicPr>
+          <p:nvPr/>
+        </p:nvPicPr>
+        <p:blipFill>
+          <a:blip r:embed="rId14">
+            <a:extLst>
+              <a:ext uri="{28A0092B-C50C-407E-A947-70E740481C1C}">
+                <a14:useLocalDpi xmlns:a14="http://schemas.microsoft.com/office/drawing/2010/main" val="0"/>
+              </a:ext>
+              <a:ext uri="{96DAC541-7B7A-43D3-8B79-37D633B846F1}">
+                <asvg:svgBlip xmlns:asvg="http://schemas.microsoft.com/office/drawing/2016/SVG/main" r:embed="rId15"/>
+              </a:ext>
+            </a:extLst>
+          </a:blip>
+          <a:stretch>
+            <a:fillRect/>
+          </a:stretch>
+        </p:blipFill>
+        <p:spPr>
+          <a:xfrm>
+            <a:off x="1619219" y="2578259"/>
+            <a:ext cx="450000" cy="450000"/>
+          </a:xfrm>
+          <a:prstGeom prst="rect">
+            <a:avLst/>
+          </a:prstGeom>
+        </p:spPr>
+      </p:pic>
+      <p:sp>
+        <p:nvSpPr>
+          <p:cNvPr id="51" name="Rectángulo: esquinas redondeadas 50">
+            <a:extLst>
+              <a:ext uri="{FF2B5EF4-FFF2-40B4-BE49-F238E27FC236}">
+                <a16:creationId xmlns:a16="http://schemas.microsoft.com/office/drawing/2014/main" id="{250C8C85-83B3-4140-B274-D5D785E3ECC4}"/>
+              </a:ext>
+            </a:extLst>
+          </p:cNvPr>
+          <p:cNvSpPr/>
+          <p:nvPr/>
+        </p:nvSpPr>
+        <p:spPr>
+          <a:xfrm>
+            <a:off x="3586243" y="2972337"/>
+            <a:ext cx="2068467" cy="402481"/>
+          </a:xfrm>
+          <a:prstGeom prst="roundRect">
+            <a:avLst>
+              <a:gd name="adj" fmla="val 50000"/>
+            </a:avLst>
+          </a:prstGeom>
+          <a:solidFill>
+            <a:srgbClr val="FF3300"/>
+          </a:solidFill>
+          <a:ln>
+            <a:noFill/>
+          </a:ln>
+          <a:effectLst>
+            <a:outerShdw blurRad="50800" dist="38100" dir="5400000" algn="t" rotWithShape="0">
+              <a:prstClr val="black">
+                <a:alpha val="40000"/>
+              </a:prstClr>
+            </a:outerShdw>
+          </a:effectLst>
+        </p:spPr>
+        <p:style>
+          <a:lnRef idx="2">
+            <a:schemeClr val="accent1">
+              <a:shade val="50000"/>
+            </a:schemeClr>
+          </a:lnRef>
+          <a:fillRef idx="1">
+            <a:schemeClr val="accent1"/>
+          </a:fillRef>
+          <a:effectRef idx="0">
+            <a:schemeClr val="accent1"/>
+          </a:effectRef>
+          <a:fontRef idx="minor">
+            <a:schemeClr val="lt1"/>
+          </a:fontRef>
+        </p:style>
+        <p:txBody>
+          <a:bodyPr rtlCol="0" anchor="ctr"/>
+          <a:lstStyle/>
+          <a:p>
+            <a:pPr algn="ctr"/>
+            <a:r>
+              <a:rPr lang="es-MX" dirty="0"/>
+              <a:t>     Escribir Reseña</a:t>
+            </a:r>
+          </a:p>
+        </p:txBody>
+      </p:sp>
+      <p:pic>
+        <p:nvPicPr>
+          <p:cNvPr id="53" name="Gráfico 52" descr="Burbuja de chat con relleno sólido">
+            <a:extLst>
+              <a:ext uri="{FF2B5EF4-FFF2-40B4-BE49-F238E27FC236}">
+                <a16:creationId xmlns:a16="http://schemas.microsoft.com/office/drawing/2014/main" id="{A3073D1B-6CEC-42C5-8DCC-1EC9B5BC555E}"/>
+              </a:ext>
+            </a:extLst>
+          </p:cNvPr>
+          <p:cNvPicPr>
+            <a:picLocks noChangeAspect="1"/>
+          </p:cNvPicPr>
+          <p:nvPr/>
+        </p:nvPicPr>
+        <p:blipFill rotWithShape="1">
+          <a:blip r:embed="rId16">
+            <a:extLst>
+              <a:ext uri="{28A0092B-C50C-407E-A947-70E740481C1C}">
+                <a14:useLocalDpi xmlns:a14="http://schemas.microsoft.com/office/drawing/2010/main" val="0"/>
+              </a:ext>
+              <a:ext uri="{96DAC541-7B7A-43D3-8B79-37D633B846F1}">
+                <asvg:svgBlip xmlns:asvg="http://schemas.microsoft.com/office/drawing/2016/SVG/main" r:embed="rId17"/>
+              </a:ext>
+            </a:extLst>
+          </a:blip>
+          <a:srcRect l="11332" t="14577" r="11807" b="14327"/>
+          <a:stretch/>
+        </p:blipFill>
+        <p:spPr>
+          <a:xfrm>
+            <a:off x="3736227" y="3081004"/>
+            <a:ext cx="232968" cy="215496"/>
+          </a:xfrm>
+          <a:prstGeom prst="rect">
+            <a:avLst/>
+          </a:prstGeom>
+        </p:spPr>
+      </p:pic>
+      <p:pic>
+        <p:nvPicPr>
+          <p:cNvPr id="55" name="Gráfico 54" descr="Cara triste con relleno sólido con relleno sólido">
+            <a:extLst>
+              <a:ext uri="{FF2B5EF4-FFF2-40B4-BE49-F238E27FC236}">
+                <a16:creationId xmlns:a16="http://schemas.microsoft.com/office/drawing/2014/main" id="{1C1C3E97-A46E-44FD-991C-EBDCCA47B83F}"/>
+              </a:ext>
+            </a:extLst>
+          </p:cNvPr>
+          <p:cNvPicPr>
+            <a:picLocks noChangeAspect="1"/>
+          </p:cNvPicPr>
+          <p:nvPr/>
+        </p:nvPicPr>
+        <p:blipFill>
+          <a:blip r:embed="rId18">
+            <a:extLst>
+              <a:ext uri="{28A0092B-C50C-407E-A947-70E740481C1C}">
+                <a14:useLocalDpi xmlns:a14="http://schemas.microsoft.com/office/drawing/2010/main" val="0"/>
+              </a:ext>
+              <a:ext uri="{96DAC541-7B7A-43D3-8B79-37D633B846F1}">
+                <asvg:svgBlip xmlns:asvg="http://schemas.microsoft.com/office/drawing/2016/SVG/main" r:embed="rId19"/>
+              </a:ext>
+            </a:extLst>
+          </a:blip>
+          <a:stretch>
+            <a:fillRect/>
+          </a:stretch>
+        </p:blipFill>
+        <p:spPr>
+          <a:xfrm>
+            <a:off x="1070379" y="2578259"/>
+            <a:ext cx="450000" cy="450000"/>
+          </a:xfrm>
+          <a:prstGeom prst="rect">
+            <a:avLst/>
+          </a:prstGeom>
+        </p:spPr>
+      </p:pic>
+      <p:pic>
+        <p:nvPicPr>
+          <p:cNvPr id="59" name="Gráfico 58" descr="Cara con ojos de estrella con relleno sólido con relleno sólido">
+            <a:extLst>
+              <a:ext uri="{FF2B5EF4-FFF2-40B4-BE49-F238E27FC236}">
+                <a16:creationId xmlns:a16="http://schemas.microsoft.com/office/drawing/2014/main" id="{0B4B942F-AFD6-4DCB-A76C-D4E75E9F2D5B}"/>
+              </a:ext>
+            </a:extLst>
+          </p:cNvPr>
+          <p:cNvPicPr>
+            <a:picLocks noChangeAspect="1"/>
+          </p:cNvPicPr>
+          <p:nvPr/>
+        </p:nvPicPr>
+        <p:blipFill>
+          <a:blip r:embed="rId12">
+            <a:extLst>
+              <a:ext uri="{28A0092B-C50C-407E-A947-70E740481C1C}">
+                <a14:useLocalDpi xmlns:a14="http://schemas.microsoft.com/office/drawing/2010/main" val="0"/>
+              </a:ext>
+              <a:ext uri="{96DAC541-7B7A-43D3-8B79-37D633B846F1}">
+                <asvg:svgBlip xmlns:asvg="http://schemas.microsoft.com/office/drawing/2016/SVG/main" r:embed="rId13"/>
+              </a:ext>
+            </a:extLst>
+          </a:blip>
+          <a:stretch>
+            <a:fillRect/>
+          </a:stretch>
+        </p:blipFill>
+        <p:spPr>
+          <a:xfrm>
+            <a:off x="2716274" y="2578259"/>
+            <a:ext cx="450000" cy="450000"/>
+          </a:xfrm>
+          <a:prstGeom prst="rect">
+            <a:avLst/>
+          </a:prstGeom>
+        </p:spPr>
+      </p:pic>
+    </p:spTree>
+    <p:extLst>
+      <p:ext uri="{BB962C8B-B14F-4D97-AF65-F5344CB8AC3E}">
+        <p14:creationId xmlns:p14="http://schemas.microsoft.com/office/powerpoint/2010/main" val="545899485"/>
       </p:ext>
     </p:extLst>
   </p:cSld>

</xml_diff>